<commit_message>
the end my friend
</commit_message>
<xml_diff>
--- a/task_02/aml-ex2.pptx
+++ b/task_02/aml-ex2.pptx
@@ -9,7 +9,8 @@
     <p:sldId id="257" r:id="rId3"/>
     <p:sldId id="258" r:id="rId4"/>
     <p:sldId id="259" r:id="rId5"/>
-    <p:sldId id="260" r:id="rId6"/>
+    <p:sldId id="262" r:id="rId6"/>
+    <p:sldId id="263" r:id="rId7"/>
   </p:sldIdLst>
   <p:sldSz cx="12192000" cy="6858000"/>
   <p:notesSz cx="6858000" cy="9144000"/>
@@ -109,10 +110,6 @@
     </a:lvl9pPr>
   </p:defaultTextStyle>
 </p:presentation>
-</file>
-
-<file path=ppt/revisionInfo.xml><?xml version="1.0" encoding="utf-8"?>
-<p1510:revInfo xmlns:a="http://schemas.openxmlformats.org/drawingml/2006/main" xmlns:r="http://schemas.openxmlformats.org/officeDocument/2006/relationships" xmlns:p1510="http://schemas.microsoft.com/office/powerpoint/2015/10/main"/>
 </file>
 
 <file path=ppt/slideLayouts/slideLayout1.xml><?xml version="1.0" encoding="utf-8"?>
@@ -3723,6 +3720,1062 @@
           </a:p>
         </p:txBody>
       </p:sp>
+      <p:sp>
+        <p:nvSpPr>
+          <p:cNvPr id="4" name="Rechteck: abgerundete Ecken 3">
+            <a:extLst>
+              <a:ext uri="{FF2B5EF4-FFF2-40B4-BE49-F238E27FC236}">
+                <a16:creationId xmlns:a16="http://schemas.microsoft.com/office/drawing/2014/main" id="{A4B54E26-4545-41FC-8569-73375DF6B646}"/>
+              </a:ext>
+            </a:extLst>
+          </p:cNvPr>
+          <p:cNvSpPr/>
+          <p:nvPr/>
+        </p:nvSpPr>
+        <p:spPr>
+          <a:xfrm>
+            <a:off x="7469579" y="998137"/>
+            <a:ext cx="1472540" cy="486888"/>
+          </a:xfrm>
+          <a:prstGeom prst="roundRect">
+            <a:avLst/>
+          </a:prstGeom>
+        </p:spPr>
+        <p:style>
+          <a:lnRef idx="2">
+            <a:schemeClr val="accent5">
+              <a:shade val="50000"/>
+            </a:schemeClr>
+          </a:lnRef>
+          <a:fillRef idx="1">
+            <a:schemeClr val="accent5"/>
+          </a:fillRef>
+          <a:effectRef idx="0">
+            <a:schemeClr val="accent5"/>
+          </a:effectRef>
+          <a:fontRef idx="minor">
+            <a:schemeClr val="lt1"/>
+          </a:fontRef>
+        </p:style>
+        <p:txBody>
+          <a:bodyPr rtlCol="0" anchor="ctr"/>
+          <a:lstStyle/>
+          <a:p>
+            <a:pPr algn="ctr"/>
+            <a:r>
+              <a:rPr lang="en-US" dirty="0"/>
+              <a:t>Proteome I</a:t>
+            </a:r>
+          </a:p>
+        </p:txBody>
+      </p:sp>
+      <p:sp>
+        <p:nvSpPr>
+          <p:cNvPr id="6" name="Rechteck: abgerundete Ecken 5">
+            <a:extLst>
+              <a:ext uri="{FF2B5EF4-FFF2-40B4-BE49-F238E27FC236}">
+                <a16:creationId xmlns:a16="http://schemas.microsoft.com/office/drawing/2014/main" id="{AB540E77-E935-4406-88F0-673DB319CEB7}"/>
+              </a:ext>
+            </a:extLst>
+          </p:cNvPr>
+          <p:cNvSpPr/>
+          <p:nvPr/>
+        </p:nvSpPr>
+        <p:spPr>
+          <a:xfrm>
+            <a:off x="9078686" y="977189"/>
+            <a:ext cx="1472540" cy="486888"/>
+          </a:xfrm>
+          <a:prstGeom prst="roundRect">
+            <a:avLst/>
+          </a:prstGeom>
+        </p:spPr>
+        <p:style>
+          <a:lnRef idx="2">
+            <a:schemeClr val="accent5">
+              <a:shade val="50000"/>
+            </a:schemeClr>
+          </a:lnRef>
+          <a:fillRef idx="1">
+            <a:schemeClr val="accent5"/>
+          </a:fillRef>
+          <a:effectRef idx="0">
+            <a:schemeClr val="accent5"/>
+          </a:effectRef>
+          <a:fontRef idx="minor">
+            <a:schemeClr val="lt1"/>
+          </a:fontRef>
+        </p:style>
+        <p:txBody>
+          <a:bodyPr rtlCol="0" anchor="ctr"/>
+          <a:lstStyle/>
+          <a:p>
+            <a:pPr algn="ctr"/>
+            <a:r>
+              <a:rPr lang="en-US" dirty="0"/>
+              <a:t>Proteome  II</a:t>
+            </a:r>
+          </a:p>
+        </p:txBody>
+      </p:sp>
+      <p:sp>
+        <p:nvSpPr>
+          <p:cNvPr id="7" name="Rechteck: abgerundete Ecken 6">
+            <a:extLst>
+              <a:ext uri="{FF2B5EF4-FFF2-40B4-BE49-F238E27FC236}">
+                <a16:creationId xmlns:a16="http://schemas.microsoft.com/office/drawing/2014/main" id="{FB91715A-594D-4E12-AF53-6642E39D4D74}"/>
+              </a:ext>
+            </a:extLst>
+          </p:cNvPr>
+          <p:cNvSpPr/>
+          <p:nvPr/>
+        </p:nvSpPr>
+        <p:spPr>
+          <a:xfrm>
+            <a:off x="10685814" y="977189"/>
+            <a:ext cx="1472540" cy="486888"/>
+          </a:xfrm>
+          <a:prstGeom prst="roundRect">
+            <a:avLst/>
+          </a:prstGeom>
+        </p:spPr>
+        <p:style>
+          <a:lnRef idx="2">
+            <a:schemeClr val="accent5">
+              <a:shade val="50000"/>
+            </a:schemeClr>
+          </a:lnRef>
+          <a:fillRef idx="1">
+            <a:schemeClr val="accent5"/>
+          </a:fillRef>
+          <a:effectRef idx="0">
+            <a:schemeClr val="accent5"/>
+          </a:effectRef>
+          <a:fontRef idx="minor">
+            <a:schemeClr val="lt1"/>
+          </a:fontRef>
+        </p:style>
+        <p:txBody>
+          <a:bodyPr rtlCol="0" anchor="ctr"/>
+          <a:lstStyle/>
+          <a:p>
+            <a:pPr algn="ctr"/>
+            <a:r>
+              <a:rPr lang="en-US" dirty="0"/>
+              <a:t>Proteome III</a:t>
+            </a:r>
+          </a:p>
+        </p:txBody>
+      </p:sp>
+      <p:sp>
+        <p:nvSpPr>
+          <p:cNvPr id="8" name="Rechteck: abgerundete Ecken 7">
+            <a:extLst>
+              <a:ext uri="{FF2B5EF4-FFF2-40B4-BE49-F238E27FC236}">
+                <a16:creationId xmlns:a16="http://schemas.microsoft.com/office/drawing/2014/main" id="{3F99B687-3AF1-47F2-8B88-20127DB8DD92}"/>
+              </a:ext>
+            </a:extLst>
+          </p:cNvPr>
+          <p:cNvSpPr/>
+          <p:nvPr/>
+        </p:nvSpPr>
+        <p:spPr>
+          <a:xfrm>
+            <a:off x="7184819" y="2177576"/>
+            <a:ext cx="1127909" cy="486888"/>
+          </a:xfrm>
+          <a:prstGeom prst="roundRect">
+            <a:avLst/>
+          </a:prstGeom>
+          <a:solidFill>
+            <a:schemeClr val="accent6">
+              <a:lumMod val="75000"/>
+            </a:schemeClr>
+          </a:solidFill>
+        </p:spPr>
+        <p:style>
+          <a:lnRef idx="2">
+            <a:schemeClr val="accent5">
+              <a:shade val="50000"/>
+            </a:schemeClr>
+          </a:lnRef>
+          <a:fillRef idx="1">
+            <a:schemeClr val="accent5"/>
+          </a:fillRef>
+          <a:effectRef idx="0">
+            <a:schemeClr val="accent5"/>
+          </a:effectRef>
+          <a:fontRef idx="minor">
+            <a:schemeClr val="lt1"/>
+          </a:fontRef>
+        </p:style>
+        <p:txBody>
+          <a:bodyPr rtlCol="0" anchor="ctr"/>
+          <a:lstStyle/>
+          <a:p>
+            <a:pPr algn="ctr"/>
+            <a:r>
+              <a:rPr lang="en-US" dirty="0" err="1"/>
+              <a:t>UniParc</a:t>
+            </a:r>
+            <a:r>
+              <a:rPr lang="en-US" dirty="0"/>
+              <a:t> I</a:t>
+            </a:r>
+          </a:p>
+        </p:txBody>
+      </p:sp>
+      <p:sp>
+        <p:nvSpPr>
+          <p:cNvPr id="9" name="Rechteck: abgerundete Ecken 8">
+            <a:extLst>
+              <a:ext uri="{FF2B5EF4-FFF2-40B4-BE49-F238E27FC236}">
+                <a16:creationId xmlns:a16="http://schemas.microsoft.com/office/drawing/2014/main" id="{496ACAFE-FC6A-47CE-BDB5-806A0701448A}"/>
+              </a:ext>
+            </a:extLst>
+          </p:cNvPr>
+          <p:cNvSpPr/>
+          <p:nvPr/>
+        </p:nvSpPr>
+        <p:spPr>
+          <a:xfrm>
+            <a:off x="8394124" y="2162105"/>
+            <a:ext cx="1134093" cy="486888"/>
+          </a:xfrm>
+          <a:prstGeom prst="roundRect">
+            <a:avLst/>
+          </a:prstGeom>
+          <a:solidFill>
+            <a:schemeClr val="accent6">
+              <a:lumMod val="75000"/>
+            </a:schemeClr>
+          </a:solidFill>
+        </p:spPr>
+        <p:style>
+          <a:lnRef idx="2">
+            <a:schemeClr val="accent5">
+              <a:shade val="50000"/>
+            </a:schemeClr>
+          </a:lnRef>
+          <a:fillRef idx="1">
+            <a:schemeClr val="accent5"/>
+          </a:fillRef>
+          <a:effectRef idx="0">
+            <a:schemeClr val="accent5"/>
+          </a:effectRef>
+          <a:fontRef idx="minor">
+            <a:schemeClr val="lt1"/>
+          </a:fontRef>
+        </p:style>
+        <p:txBody>
+          <a:bodyPr rtlCol="0" anchor="ctr"/>
+          <a:lstStyle/>
+          <a:p>
+            <a:pPr algn="ctr"/>
+            <a:r>
+              <a:rPr lang="en-US" dirty="0" err="1"/>
+              <a:t>UniParc</a:t>
+            </a:r>
+            <a:r>
+              <a:rPr lang="en-US" dirty="0"/>
+              <a:t> II</a:t>
+            </a:r>
+          </a:p>
+        </p:txBody>
+      </p:sp>
+      <p:sp>
+        <p:nvSpPr>
+          <p:cNvPr id="10" name="Rechteck: abgerundete Ecken 9">
+            <a:extLst>
+              <a:ext uri="{FF2B5EF4-FFF2-40B4-BE49-F238E27FC236}">
+                <a16:creationId xmlns:a16="http://schemas.microsoft.com/office/drawing/2014/main" id="{F26C9911-D4AB-4ABC-ACE2-82BFFCF7A165}"/>
+              </a:ext>
+            </a:extLst>
+          </p:cNvPr>
+          <p:cNvSpPr/>
+          <p:nvPr/>
+        </p:nvSpPr>
+        <p:spPr>
+          <a:xfrm>
+            <a:off x="9603675" y="2146239"/>
+            <a:ext cx="1237012" cy="486888"/>
+          </a:xfrm>
+          <a:prstGeom prst="roundRect">
+            <a:avLst/>
+          </a:prstGeom>
+          <a:solidFill>
+            <a:schemeClr val="accent6">
+              <a:lumMod val="75000"/>
+            </a:schemeClr>
+          </a:solidFill>
+        </p:spPr>
+        <p:style>
+          <a:lnRef idx="2">
+            <a:schemeClr val="accent5">
+              <a:shade val="50000"/>
+            </a:schemeClr>
+          </a:lnRef>
+          <a:fillRef idx="1">
+            <a:schemeClr val="accent5"/>
+          </a:fillRef>
+          <a:effectRef idx="0">
+            <a:schemeClr val="accent5"/>
+          </a:effectRef>
+          <a:fontRef idx="minor">
+            <a:schemeClr val="lt1"/>
+          </a:fontRef>
+        </p:style>
+        <p:txBody>
+          <a:bodyPr rtlCol="0" anchor="ctr"/>
+          <a:lstStyle/>
+          <a:p>
+            <a:pPr algn="ctr"/>
+            <a:r>
+              <a:rPr lang="en-US" dirty="0" err="1"/>
+              <a:t>UniParc</a:t>
+            </a:r>
+            <a:r>
+              <a:rPr lang="en-US" dirty="0"/>
+              <a:t> III</a:t>
+            </a:r>
+          </a:p>
+        </p:txBody>
+      </p:sp>
+      <p:sp>
+        <p:nvSpPr>
+          <p:cNvPr id="11" name="Rechteck: abgerundete Ecken 10">
+            <a:extLst>
+              <a:ext uri="{FF2B5EF4-FFF2-40B4-BE49-F238E27FC236}">
+                <a16:creationId xmlns:a16="http://schemas.microsoft.com/office/drawing/2014/main" id="{15CEA2D6-AF4C-414C-A80B-89C2F167667B}"/>
+              </a:ext>
+            </a:extLst>
+          </p:cNvPr>
+          <p:cNvSpPr/>
+          <p:nvPr/>
+        </p:nvSpPr>
+        <p:spPr>
+          <a:xfrm>
+            <a:off x="7469578" y="3639913"/>
+            <a:ext cx="1009403" cy="486888"/>
+          </a:xfrm>
+          <a:prstGeom prst="roundRect">
+            <a:avLst/>
+          </a:prstGeom>
+          <a:solidFill>
+            <a:schemeClr val="accent4">
+              <a:lumMod val="75000"/>
+            </a:schemeClr>
+          </a:solidFill>
+        </p:spPr>
+        <p:style>
+          <a:lnRef idx="2">
+            <a:schemeClr val="accent5">
+              <a:shade val="50000"/>
+            </a:schemeClr>
+          </a:lnRef>
+          <a:fillRef idx="1">
+            <a:schemeClr val="accent5"/>
+          </a:fillRef>
+          <a:effectRef idx="0">
+            <a:schemeClr val="accent5"/>
+          </a:effectRef>
+          <a:fontRef idx="minor">
+            <a:schemeClr val="lt1"/>
+          </a:fontRef>
+        </p:style>
+        <p:txBody>
+          <a:bodyPr rtlCol="0" anchor="ctr"/>
+          <a:lstStyle/>
+          <a:p>
+            <a:pPr algn="ctr"/>
+            <a:r>
+              <a:rPr lang="en-US" dirty="0" err="1"/>
+              <a:t>UniProt</a:t>
+            </a:r>
+            <a:r>
+              <a:rPr lang="en-US" dirty="0"/>
+              <a:t> I</a:t>
+            </a:r>
+          </a:p>
+        </p:txBody>
+      </p:sp>
+      <p:sp>
+        <p:nvSpPr>
+          <p:cNvPr id="12" name="Rechteck: abgerundete Ecken 11">
+            <a:extLst>
+              <a:ext uri="{FF2B5EF4-FFF2-40B4-BE49-F238E27FC236}">
+                <a16:creationId xmlns:a16="http://schemas.microsoft.com/office/drawing/2014/main" id="{1CA53F67-3E5C-437C-BDFB-6C7C8FD5E8CA}"/>
+              </a:ext>
+            </a:extLst>
+          </p:cNvPr>
+          <p:cNvSpPr/>
+          <p:nvPr/>
+        </p:nvSpPr>
+        <p:spPr>
+          <a:xfrm>
+            <a:off x="8597488" y="3639913"/>
+            <a:ext cx="962396" cy="486888"/>
+          </a:xfrm>
+          <a:prstGeom prst="roundRect">
+            <a:avLst/>
+          </a:prstGeom>
+          <a:solidFill>
+            <a:schemeClr val="accent4">
+              <a:lumMod val="75000"/>
+            </a:schemeClr>
+          </a:solidFill>
+        </p:spPr>
+        <p:style>
+          <a:lnRef idx="2">
+            <a:schemeClr val="accent5">
+              <a:shade val="50000"/>
+            </a:schemeClr>
+          </a:lnRef>
+          <a:fillRef idx="1">
+            <a:schemeClr val="accent5"/>
+          </a:fillRef>
+          <a:effectRef idx="0">
+            <a:schemeClr val="accent5"/>
+          </a:effectRef>
+          <a:fontRef idx="minor">
+            <a:schemeClr val="lt1"/>
+          </a:fontRef>
+        </p:style>
+        <p:txBody>
+          <a:bodyPr rtlCol="0" anchor="ctr"/>
+          <a:lstStyle/>
+          <a:p>
+            <a:pPr algn="ctr"/>
+            <a:r>
+              <a:rPr lang="en-US" dirty="0" err="1"/>
+              <a:t>UniProt</a:t>
+            </a:r>
+            <a:r>
+              <a:rPr lang="en-US" dirty="0"/>
+              <a:t> II</a:t>
+            </a:r>
+          </a:p>
+        </p:txBody>
+      </p:sp>
+      <p:sp>
+        <p:nvSpPr>
+          <p:cNvPr id="13" name="Rechteck: abgerundete Ecken 12">
+            <a:extLst>
+              <a:ext uri="{FF2B5EF4-FFF2-40B4-BE49-F238E27FC236}">
+                <a16:creationId xmlns:a16="http://schemas.microsoft.com/office/drawing/2014/main" id="{167D2E2A-623B-4118-BF53-0127066466B5}"/>
+              </a:ext>
+            </a:extLst>
+          </p:cNvPr>
+          <p:cNvSpPr/>
+          <p:nvPr/>
+        </p:nvSpPr>
+        <p:spPr>
+          <a:xfrm>
+            <a:off x="9678391" y="3639913"/>
+            <a:ext cx="950025" cy="486888"/>
+          </a:xfrm>
+          <a:prstGeom prst="roundRect">
+            <a:avLst/>
+          </a:prstGeom>
+          <a:solidFill>
+            <a:schemeClr val="accent4">
+              <a:lumMod val="75000"/>
+            </a:schemeClr>
+          </a:solidFill>
+        </p:spPr>
+        <p:style>
+          <a:lnRef idx="2">
+            <a:schemeClr val="accent5">
+              <a:shade val="50000"/>
+            </a:schemeClr>
+          </a:lnRef>
+          <a:fillRef idx="1">
+            <a:schemeClr val="accent5"/>
+          </a:fillRef>
+          <a:effectRef idx="0">
+            <a:schemeClr val="accent5"/>
+          </a:effectRef>
+          <a:fontRef idx="minor">
+            <a:schemeClr val="lt1"/>
+          </a:fontRef>
+        </p:style>
+        <p:txBody>
+          <a:bodyPr rtlCol="0" anchor="ctr"/>
+          <a:lstStyle/>
+          <a:p>
+            <a:pPr algn="ctr"/>
+            <a:r>
+              <a:rPr lang="en-US" dirty="0" err="1"/>
+              <a:t>UniPort</a:t>
+            </a:r>
+            <a:r>
+              <a:rPr lang="en-US" dirty="0"/>
+              <a:t> III</a:t>
+            </a:r>
+          </a:p>
+        </p:txBody>
+      </p:sp>
+      <p:sp>
+        <p:nvSpPr>
+          <p:cNvPr id="14" name="Rechteck: abgerundete Ecken 13">
+            <a:extLst>
+              <a:ext uri="{FF2B5EF4-FFF2-40B4-BE49-F238E27FC236}">
+                <a16:creationId xmlns:a16="http://schemas.microsoft.com/office/drawing/2014/main" id="{A8349DC6-A006-4DA9-9E55-ACDE59A23F7B}"/>
+              </a:ext>
+            </a:extLst>
+          </p:cNvPr>
+          <p:cNvSpPr/>
+          <p:nvPr/>
+        </p:nvSpPr>
+        <p:spPr>
+          <a:xfrm>
+            <a:off x="10685814" y="3639913"/>
+            <a:ext cx="950025" cy="486888"/>
+          </a:xfrm>
+          <a:prstGeom prst="roundRect">
+            <a:avLst/>
+          </a:prstGeom>
+          <a:solidFill>
+            <a:schemeClr val="accent4">
+              <a:lumMod val="75000"/>
+            </a:schemeClr>
+          </a:solidFill>
+        </p:spPr>
+        <p:style>
+          <a:lnRef idx="2">
+            <a:schemeClr val="accent5">
+              <a:shade val="50000"/>
+            </a:schemeClr>
+          </a:lnRef>
+          <a:fillRef idx="1">
+            <a:schemeClr val="accent5"/>
+          </a:fillRef>
+          <a:effectRef idx="0">
+            <a:schemeClr val="accent5"/>
+          </a:effectRef>
+          <a:fontRef idx="minor">
+            <a:schemeClr val="lt1"/>
+          </a:fontRef>
+        </p:style>
+        <p:txBody>
+          <a:bodyPr rtlCol="0" anchor="ctr"/>
+          <a:lstStyle/>
+          <a:p>
+            <a:pPr algn="ctr"/>
+            <a:r>
+              <a:rPr lang="en-US" dirty="0" err="1"/>
+              <a:t>UniProt</a:t>
+            </a:r>
+            <a:r>
+              <a:rPr lang="en-US" dirty="0"/>
+              <a:t> IV</a:t>
+            </a:r>
+          </a:p>
+        </p:txBody>
+      </p:sp>
+      <p:cxnSp>
+        <p:nvCxnSpPr>
+          <p:cNvPr id="16" name="Gerader Verbinder 15">
+            <a:extLst>
+              <a:ext uri="{FF2B5EF4-FFF2-40B4-BE49-F238E27FC236}">
+                <a16:creationId xmlns:a16="http://schemas.microsoft.com/office/drawing/2014/main" id="{D9D9B8A4-F528-47D8-97AE-ADC17B558496}"/>
+              </a:ext>
+            </a:extLst>
+          </p:cNvPr>
+          <p:cNvCxnSpPr>
+            <a:cxnSpLocks/>
+            <a:stCxn id="8" idx="0"/>
+            <a:endCxn id="4" idx="2"/>
+          </p:cNvCxnSpPr>
+          <p:nvPr/>
+        </p:nvCxnSpPr>
+        <p:spPr>
+          <a:xfrm flipV="1">
+            <a:off x="7748774" y="1485025"/>
+            <a:ext cx="457075" cy="692551"/>
+          </a:xfrm>
+          <a:prstGeom prst="line">
+            <a:avLst/>
+          </a:prstGeom>
+          <a:ln w="38100"/>
+        </p:spPr>
+        <p:style>
+          <a:lnRef idx="1">
+            <a:schemeClr val="accent1"/>
+          </a:lnRef>
+          <a:fillRef idx="0">
+            <a:schemeClr val="accent1"/>
+          </a:fillRef>
+          <a:effectRef idx="0">
+            <a:schemeClr val="accent1"/>
+          </a:effectRef>
+          <a:fontRef idx="minor">
+            <a:schemeClr val="tx1"/>
+          </a:fontRef>
+        </p:style>
+      </p:cxnSp>
+      <p:cxnSp>
+        <p:nvCxnSpPr>
+          <p:cNvPr id="18" name="Gerader Verbinder 17">
+            <a:extLst>
+              <a:ext uri="{FF2B5EF4-FFF2-40B4-BE49-F238E27FC236}">
+                <a16:creationId xmlns:a16="http://schemas.microsoft.com/office/drawing/2014/main" id="{36B9A278-8197-453D-8C8C-564D8E005142}"/>
+              </a:ext>
+            </a:extLst>
+          </p:cNvPr>
+          <p:cNvCxnSpPr>
+            <a:cxnSpLocks/>
+            <a:stCxn id="9" idx="0"/>
+            <a:endCxn id="4" idx="2"/>
+          </p:cNvCxnSpPr>
+          <p:nvPr/>
+        </p:nvCxnSpPr>
+        <p:spPr>
+          <a:xfrm flipH="1" flipV="1">
+            <a:off x="8205849" y="1485025"/>
+            <a:ext cx="755322" cy="677080"/>
+          </a:xfrm>
+          <a:prstGeom prst="line">
+            <a:avLst/>
+          </a:prstGeom>
+          <a:ln w="38100"/>
+        </p:spPr>
+        <p:style>
+          <a:lnRef idx="1">
+            <a:schemeClr val="accent1"/>
+          </a:lnRef>
+          <a:fillRef idx="0">
+            <a:schemeClr val="accent1"/>
+          </a:fillRef>
+          <a:effectRef idx="0">
+            <a:schemeClr val="accent1"/>
+          </a:effectRef>
+          <a:fontRef idx="minor">
+            <a:schemeClr val="tx1"/>
+          </a:fontRef>
+        </p:style>
+      </p:cxnSp>
+      <p:cxnSp>
+        <p:nvCxnSpPr>
+          <p:cNvPr id="20" name="Gerader Verbinder 19">
+            <a:extLst>
+              <a:ext uri="{FF2B5EF4-FFF2-40B4-BE49-F238E27FC236}">
+                <a16:creationId xmlns:a16="http://schemas.microsoft.com/office/drawing/2014/main" id="{B5615F9A-3798-4602-A329-69E172F68BCE}"/>
+              </a:ext>
+            </a:extLst>
+          </p:cNvPr>
+          <p:cNvCxnSpPr>
+            <a:cxnSpLocks/>
+            <a:stCxn id="8" idx="0"/>
+            <a:endCxn id="6" idx="2"/>
+          </p:cNvCxnSpPr>
+          <p:nvPr/>
+        </p:nvCxnSpPr>
+        <p:spPr>
+          <a:xfrm flipV="1">
+            <a:off x="7748774" y="1464077"/>
+            <a:ext cx="2066182" cy="713499"/>
+          </a:xfrm>
+          <a:prstGeom prst="line">
+            <a:avLst/>
+          </a:prstGeom>
+          <a:ln w="38100"/>
+        </p:spPr>
+        <p:style>
+          <a:lnRef idx="1">
+            <a:schemeClr val="accent1"/>
+          </a:lnRef>
+          <a:fillRef idx="0">
+            <a:schemeClr val="accent1"/>
+          </a:fillRef>
+          <a:effectRef idx="0">
+            <a:schemeClr val="accent1"/>
+          </a:effectRef>
+          <a:fontRef idx="minor">
+            <a:schemeClr val="tx1"/>
+          </a:fontRef>
+        </p:style>
+      </p:cxnSp>
+      <p:cxnSp>
+        <p:nvCxnSpPr>
+          <p:cNvPr id="22" name="Gerader Verbinder 21">
+            <a:extLst>
+              <a:ext uri="{FF2B5EF4-FFF2-40B4-BE49-F238E27FC236}">
+                <a16:creationId xmlns:a16="http://schemas.microsoft.com/office/drawing/2014/main" id="{2BD96F98-5F99-4C8E-AEC1-E7FC1897E216}"/>
+              </a:ext>
+            </a:extLst>
+          </p:cNvPr>
+          <p:cNvCxnSpPr>
+            <a:cxnSpLocks/>
+            <a:stCxn id="9" idx="0"/>
+            <a:endCxn id="6" idx="2"/>
+          </p:cNvCxnSpPr>
+          <p:nvPr/>
+        </p:nvCxnSpPr>
+        <p:spPr>
+          <a:xfrm flipV="1">
+            <a:off x="8961171" y="1464077"/>
+            <a:ext cx="853785" cy="698028"/>
+          </a:xfrm>
+          <a:prstGeom prst="line">
+            <a:avLst/>
+          </a:prstGeom>
+          <a:ln w="38100"/>
+        </p:spPr>
+        <p:style>
+          <a:lnRef idx="1">
+            <a:schemeClr val="accent1"/>
+          </a:lnRef>
+          <a:fillRef idx="0">
+            <a:schemeClr val="accent1"/>
+          </a:fillRef>
+          <a:effectRef idx="0">
+            <a:schemeClr val="accent1"/>
+          </a:effectRef>
+          <a:fontRef idx="minor">
+            <a:schemeClr val="tx1"/>
+          </a:fontRef>
+        </p:style>
+      </p:cxnSp>
+      <p:cxnSp>
+        <p:nvCxnSpPr>
+          <p:cNvPr id="24" name="Gerader Verbinder 23">
+            <a:extLst>
+              <a:ext uri="{FF2B5EF4-FFF2-40B4-BE49-F238E27FC236}">
+                <a16:creationId xmlns:a16="http://schemas.microsoft.com/office/drawing/2014/main" id="{007A0E6C-6048-4E3D-ADC9-2E68B979BA2C}"/>
+              </a:ext>
+            </a:extLst>
+          </p:cNvPr>
+          <p:cNvCxnSpPr>
+            <a:cxnSpLocks/>
+            <a:stCxn id="10" idx="0"/>
+            <a:endCxn id="6" idx="2"/>
+          </p:cNvCxnSpPr>
+          <p:nvPr/>
+        </p:nvCxnSpPr>
+        <p:spPr>
+          <a:xfrm flipH="1" flipV="1">
+            <a:off x="9814956" y="1464077"/>
+            <a:ext cx="407225" cy="682162"/>
+          </a:xfrm>
+          <a:prstGeom prst="line">
+            <a:avLst/>
+          </a:prstGeom>
+          <a:ln w="38100"/>
+        </p:spPr>
+        <p:style>
+          <a:lnRef idx="1">
+            <a:schemeClr val="accent1"/>
+          </a:lnRef>
+          <a:fillRef idx="0">
+            <a:schemeClr val="accent1"/>
+          </a:fillRef>
+          <a:effectRef idx="0">
+            <a:schemeClr val="accent1"/>
+          </a:effectRef>
+          <a:fontRef idx="minor">
+            <a:schemeClr val="tx1"/>
+          </a:fontRef>
+        </p:style>
+      </p:cxnSp>
+      <p:cxnSp>
+        <p:nvCxnSpPr>
+          <p:cNvPr id="26" name="Gerader Verbinder 25">
+            <a:extLst>
+              <a:ext uri="{FF2B5EF4-FFF2-40B4-BE49-F238E27FC236}">
+                <a16:creationId xmlns:a16="http://schemas.microsoft.com/office/drawing/2014/main" id="{BAE76438-0F11-47DF-8B9B-8D5B9DB69161}"/>
+              </a:ext>
+            </a:extLst>
+          </p:cNvPr>
+          <p:cNvCxnSpPr>
+            <a:cxnSpLocks/>
+            <a:stCxn id="10" idx="0"/>
+            <a:endCxn id="10" idx="0"/>
+          </p:cNvCxnSpPr>
+          <p:nvPr/>
+        </p:nvCxnSpPr>
+        <p:spPr>
+          <a:xfrm>
+            <a:off x="10222181" y="2146239"/>
+            <a:ext cx="0" cy="0"/>
+          </a:xfrm>
+          <a:prstGeom prst="line">
+            <a:avLst/>
+          </a:prstGeom>
+        </p:spPr>
+        <p:style>
+          <a:lnRef idx="1">
+            <a:schemeClr val="accent1"/>
+          </a:lnRef>
+          <a:fillRef idx="0">
+            <a:schemeClr val="accent1"/>
+          </a:fillRef>
+          <a:effectRef idx="0">
+            <a:schemeClr val="accent1"/>
+          </a:effectRef>
+          <a:fontRef idx="minor">
+            <a:schemeClr val="tx1"/>
+          </a:fontRef>
+        </p:style>
+      </p:cxnSp>
+      <p:sp>
+        <p:nvSpPr>
+          <p:cNvPr id="37" name="Rechteck: abgerundete Ecken 36">
+            <a:extLst>
+              <a:ext uri="{FF2B5EF4-FFF2-40B4-BE49-F238E27FC236}">
+                <a16:creationId xmlns:a16="http://schemas.microsoft.com/office/drawing/2014/main" id="{65BBAAFE-236D-4048-85C3-F4BC61190DF1}"/>
+              </a:ext>
+            </a:extLst>
+          </p:cNvPr>
+          <p:cNvSpPr/>
+          <p:nvPr/>
+        </p:nvSpPr>
+        <p:spPr>
+          <a:xfrm>
+            <a:off x="10921093" y="2146239"/>
+            <a:ext cx="1127909" cy="486888"/>
+          </a:xfrm>
+          <a:prstGeom prst="roundRect">
+            <a:avLst/>
+          </a:prstGeom>
+          <a:solidFill>
+            <a:schemeClr val="accent6">
+              <a:lumMod val="75000"/>
+            </a:schemeClr>
+          </a:solidFill>
+        </p:spPr>
+        <p:style>
+          <a:lnRef idx="2">
+            <a:schemeClr val="accent5">
+              <a:shade val="50000"/>
+            </a:schemeClr>
+          </a:lnRef>
+          <a:fillRef idx="1">
+            <a:schemeClr val="accent5"/>
+          </a:fillRef>
+          <a:effectRef idx="0">
+            <a:schemeClr val="accent5"/>
+          </a:effectRef>
+          <a:fontRef idx="minor">
+            <a:schemeClr val="lt1"/>
+          </a:fontRef>
+        </p:style>
+        <p:txBody>
+          <a:bodyPr rtlCol="0" anchor="ctr"/>
+          <a:lstStyle/>
+          <a:p>
+            <a:pPr algn="ctr"/>
+            <a:r>
+              <a:rPr lang="en-US" dirty="0" err="1"/>
+              <a:t>UniParc</a:t>
+            </a:r>
+            <a:r>
+              <a:rPr lang="en-US" dirty="0"/>
+              <a:t> I</a:t>
+            </a:r>
+          </a:p>
+        </p:txBody>
+      </p:sp>
+      <p:cxnSp>
+        <p:nvCxnSpPr>
+          <p:cNvPr id="45" name="Gerader Verbinder 44">
+            <a:extLst>
+              <a:ext uri="{FF2B5EF4-FFF2-40B4-BE49-F238E27FC236}">
+                <a16:creationId xmlns:a16="http://schemas.microsoft.com/office/drawing/2014/main" id="{E952D37D-0DEE-4C2E-AF95-2601958AEFF1}"/>
+              </a:ext>
+            </a:extLst>
+          </p:cNvPr>
+          <p:cNvCxnSpPr>
+            <a:stCxn id="11" idx="0"/>
+            <a:endCxn id="8" idx="2"/>
+          </p:cNvCxnSpPr>
+          <p:nvPr/>
+        </p:nvCxnSpPr>
+        <p:spPr>
+          <a:xfrm flipH="1" flipV="1">
+            <a:off x="7748774" y="2664464"/>
+            <a:ext cx="225506" cy="975449"/>
+          </a:xfrm>
+          <a:prstGeom prst="line">
+            <a:avLst/>
+          </a:prstGeom>
+          <a:ln w="38100"/>
+        </p:spPr>
+        <p:style>
+          <a:lnRef idx="1">
+            <a:schemeClr val="accent1"/>
+          </a:lnRef>
+          <a:fillRef idx="0">
+            <a:schemeClr val="accent1"/>
+          </a:fillRef>
+          <a:effectRef idx="0">
+            <a:schemeClr val="accent1"/>
+          </a:effectRef>
+          <a:fontRef idx="minor">
+            <a:schemeClr val="tx1"/>
+          </a:fontRef>
+        </p:style>
+      </p:cxnSp>
+      <p:cxnSp>
+        <p:nvCxnSpPr>
+          <p:cNvPr id="47" name="Gerader Verbinder 46">
+            <a:extLst>
+              <a:ext uri="{FF2B5EF4-FFF2-40B4-BE49-F238E27FC236}">
+                <a16:creationId xmlns:a16="http://schemas.microsoft.com/office/drawing/2014/main" id="{C55DEBCC-6F69-40D5-9C83-F8635744077C}"/>
+              </a:ext>
+            </a:extLst>
+          </p:cNvPr>
+          <p:cNvCxnSpPr>
+            <a:stCxn id="12" idx="0"/>
+            <a:endCxn id="8" idx="2"/>
+          </p:cNvCxnSpPr>
+          <p:nvPr/>
+        </p:nvCxnSpPr>
+        <p:spPr>
+          <a:xfrm flipH="1" flipV="1">
+            <a:off x="7748774" y="2664464"/>
+            <a:ext cx="1329912" cy="975449"/>
+          </a:xfrm>
+          <a:prstGeom prst="line">
+            <a:avLst/>
+          </a:prstGeom>
+          <a:ln w="38100"/>
+        </p:spPr>
+        <p:style>
+          <a:lnRef idx="1">
+            <a:schemeClr val="accent1"/>
+          </a:lnRef>
+          <a:fillRef idx="0">
+            <a:schemeClr val="accent1"/>
+          </a:fillRef>
+          <a:effectRef idx="0">
+            <a:schemeClr val="accent1"/>
+          </a:effectRef>
+          <a:fontRef idx="minor">
+            <a:schemeClr val="tx1"/>
+          </a:fontRef>
+        </p:style>
+      </p:cxnSp>
+      <p:cxnSp>
+        <p:nvCxnSpPr>
+          <p:cNvPr id="49" name="Gerader Verbinder 48">
+            <a:extLst>
+              <a:ext uri="{FF2B5EF4-FFF2-40B4-BE49-F238E27FC236}">
+                <a16:creationId xmlns:a16="http://schemas.microsoft.com/office/drawing/2014/main" id="{AA1A4D34-E7F9-475E-9482-2B6738EC9705}"/>
+              </a:ext>
+            </a:extLst>
+          </p:cNvPr>
+          <p:cNvCxnSpPr>
+            <a:stCxn id="14" idx="0"/>
+            <a:endCxn id="37" idx="2"/>
+          </p:cNvCxnSpPr>
+          <p:nvPr/>
+        </p:nvCxnSpPr>
+        <p:spPr>
+          <a:xfrm flipV="1">
+            <a:off x="11160827" y="2633127"/>
+            <a:ext cx="324221" cy="1006786"/>
+          </a:xfrm>
+          <a:prstGeom prst="line">
+            <a:avLst/>
+          </a:prstGeom>
+          <a:ln w="38100"/>
+        </p:spPr>
+        <p:style>
+          <a:lnRef idx="1">
+            <a:schemeClr val="accent1"/>
+          </a:lnRef>
+          <a:fillRef idx="0">
+            <a:schemeClr val="accent1"/>
+          </a:fillRef>
+          <a:effectRef idx="0">
+            <a:schemeClr val="accent1"/>
+          </a:effectRef>
+          <a:fontRef idx="minor">
+            <a:schemeClr val="tx1"/>
+          </a:fontRef>
+        </p:style>
+      </p:cxnSp>
+      <p:cxnSp>
+        <p:nvCxnSpPr>
+          <p:cNvPr id="51" name="Gerader Verbinder 50">
+            <a:extLst>
+              <a:ext uri="{FF2B5EF4-FFF2-40B4-BE49-F238E27FC236}">
+                <a16:creationId xmlns:a16="http://schemas.microsoft.com/office/drawing/2014/main" id="{F268B139-4439-42E7-A687-13B97DA7DEB7}"/>
+              </a:ext>
+            </a:extLst>
+          </p:cNvPr>
+          <p:cNvCxnSpPr>
+            <a:stCxn id="10" idx="0"/>
+            <a:endCxn id="7" idx="2"/>
+          </p:cNvCxnSpPr>
+          <p:nvPr/>
+        </p:nvCxnSpPr>
+        <p:spPr>
+          <a:xfrm flipV="1">
+            <a:off x="10222181" y="1464077"/>
+            <a:ext cx="1199903" cy="682162"/>
+          </a:xfrm>
+          <a:prstGeom prst="line">
+            <a:avLst/>
+          </a:prstGeom>
+          <a:ln w="38100"/>
+        </p:spPr>
+        <p:style>
+          <a:lnRef idx="1">
+            <a:schemeClr val="accent1"/>
+          </a:lnRef>
+          <a:fillRef idx="0">
+            <a:schemeClr val="accent1"/>
+          </a:fillRef>
+          <a:effectRef idx="0">
+            <a:schemeClr val="accent1"/>
+          </a:effectRef>
+          <a:fontRef idx="minor">
+            <a:schemeClr val="tx1"/>
+          </a:fontRef>
+        </p:style>
+      </p:cxnSp>
+      <p:cxnSp>
+        <p:nvCxnSpPr>
+          <p:cNvPr id="53" name="Gerader Verbinder 52">
+            <a:extLst>
+              <a:ext uri="{FF2B5EF4-FFF2-40B4-BE49-F238E27FC236}">
+                <a16:creationId xmlns:a16="http://schemas.microsoft.com/office/drawing/2014/main" id="{E816E941-478C-406F-B111-3C320E6ADFB9}"/>
+              </a:ext>
+            </a:extLst>
+          </p:cNvPr>
+          <p:cNvCxnSpPr>
+            <a:stCxn id="13" idx="0"/>
+            <a:endCxn id="9" idx="2"/>
+          </p:cNvCxnSpPr>
+          <p:nvPr/>
+        </p:nvCxnSpPr>
+        <p:spPr>
+          <a:xfrm flipH="1" flipV="1">
+            <a:off x="8961171" y="2648993"/>
+            <a:ext cx="1192233" cy="990920"/>
+          </a:xfrm>
+          <a:prstGeom prst="line">
+            <a:avLst/>
+          </a:prstGeom>
+          <a:ln w="38100"/>
+        </p:spPr>
+        <p:style>
+          <a:lnRef idx="1">
+            <a:schemeClr val="accent1"/>
+          </a:lnRef>
+          <a:fillRef idx="0">
+            <a:schemeClr val="accent1"/>
+          </a:fillRef>
+          <a:effectRef idx="0">
+            <a:schemeClr val="accent1"/>
+          </a:effectRef>
+          <a:fontRef idx="minor">
+            <a:schemeClr val="tx1"/>
+          </a:fontRef>
+        </p:style>
+      </p:cxnSp>
     </p:spTree>
     <p:extLst>
       <p:ext uri="{BB962C8B-B14F-4D97-AF65-F5344CB8AC3E}">
@@ -3810,7 +4863,7 @@
           <a:p>
             <a:r>
               <a:rPr lang="de-DE" dirty="0" err="1"/>
-              <a:t>Datapreparation</a:t>
+              <a:t>Preprocessing</a:t>
             </a:r>
             <a:r>
               <a:rPr lang="de-DE" dirty="0"/>
@@ -3835,14 +4888,33 @@
             <p:ph idx="1"/>
           </p:nvPr>
         </p:nvSpPr>
-        <p:spPr/>
-        <p:txBody>
-          <a:bodyPr/>
-          <a:lstStyle/>
-          <a:p>
+        <p:spPr>
+          <a:xfrm>
+            <a:off x="838200" y="1825625"/>
+            <a:ext cx="3923805" cy="3494520"/>
+          </a:xfrm>
+        </p:spPr>
+        <p:txBody>
+          <a:bodyPr>
+            <a:normAutofit/>
+          </a:bodyPr>
+          <a:lstStyle/>
+          <a:p>
+            <a:r>
+              <a:rPr lang="de-DE" dirty="0"/>
+              <a:t>Create </a:t>
+            </a:r>
             <a:r>
               <a:rPr lang="de-DE" dirty="0" err="1"/>
-              <a:t>remove</a:t>
+              <a:t>UniPrac_dict</a:t>
+            </a:r>
+            <a:r>
+              <a:rPr lang="de-DE" dirty="0"/>
+              <a:t> (</a:t>
+            </a:r>
+            <a:r>
+              <a:rPr lang="de-DE" dirty="0" err="1"/>
+              <a:t>UniParc</a:t>
             </a:r>
             <a:r>
               <a:rPr lang="de-DE" dirty="0"/>
@@ -3850,9 +4922,63 @@
             </a:r>
             <a:r>
               <a:rPr lang="de-DE" dirty="0" err="1"/>
-              <a:t>duplicates</a:t>
-            </a:r>
-            <a:endParaRPr lang="de-DE" dirty="0"/>
+              <a:t>as</a:t>
+            </a:r>
+            <a:r>
+              <a:rPr lang="de-DE" dirty="0"/>
+              <a:t> </a:t>
+            </a:r>
+            <a:r>
+              <a:rPr lang="de-DE" dirty="0" err="1"/>
+              <a:t>key</a:t>
+            </a:r>
+            <a:r>
+              <a:rPr lang="de-DE" dirty="0"/>
+              <a:t> &amp; </a:t>
+            </a:r>
+            <a:br>
+              <a:rPr lang="de-DE" dirty="0"/>
+            </a:br>
+            <a:r>
+              <a:rPr lang="de-DE" dirty="0" err="1"/>
+              <a:t>set</a:t>
+            </a:r>
+            <a:r>
+              <a:rPr lang="de-DE" dirty="0"/>
+              <a:t> </a:t>
+            </a:r>
+            <a:r>
+              <a:rPr lang="de-DE" dirty="0" err="1"/>
+              <a:t>of</a:t>
+            </a:r>
+            <a:r>
+              <a:rPr lang="de-DE" dirty="0"/>
+              <a:t> </a:t>
+            </a:r>
+            <a:r>
+              <a:rPr lang="de-DE" dirty="0" err="1"/>
+              <a:t>UniProt</a:t>
+            </a:r>
+            <a:r>
+              <a:rPr lang="de-DE" dirty="0"/>
+              <a:t> </a:t>
+            </a:r>
+            <a:r>
+              <a:rPr lang="de-DE" dirty="0" err="1"/>
+              <a:t>as</a:t>
+            </a:r>
+            <a:r>
+              <a:rPr lang="de-DE" dirty="0"/>
+              <a:t> </a:t>
+            </a:r>
+            <a:r>
+              <a:rPr lang="de-DE" dirty="0" err="1"/>
+              <a:t>value</a:t>
+            </a:r>
+            <a:r>
+              <a:rPr lang="de-DE" dirty="0"/>
+              <a:t>)</a:t>
+            </a:r>
           </a:p>
           <a:p>
             <a:r>
@@ -3861,11 +4987,50 @@
             </a:r>
             <a:r>
               <a:rPr lang="de-DE" dirty="0" err="1"/>
-              <a:t>UniPrac_dict</a:t>
+              <a:t>Proteom_dict</a:t>
             </a:r>
             <a:r>
               <a:rPr lang="de-DE" dirty="0"/>
-              <a:t> (</a:t>
+              <a:t> (Proteoms </a:t>
+            </a:r>
+            <a:r>
+              <a:rPr lang="de-DE" dirty="0" err="1"/>
+              <a:t>as</a:t>
+            </a:r>
+            <a:r>
+              <a:rPr lang="de-DE" dirty="0"/>
+              <a:t> </a:t>
+            </a:r>
+            <a:r>
+              <a:rPr lang="de-DE" dirty="0" err="1"/>
+              <a:t>key</a:t>
+            </a:r>
+            <a:r>
+              <a:rPr lang="de-DE" dirty="0"/>
+              <a:t> &amp;</a:t>
+            </a:r>
+            <a:br>
+              <a:rPr lang="de-DE" dirty="0"/>
+            </a:br>
+            <a:r>
+              <a:rPr lang="de-DE" dirty="0"/>
+              <a:t> </a:t>
+            </a:r>
+            <a:r>
+              <a:rPr lang="de-DE" dirty="0" err="1"/>
+              <a:t>set</a:t>
+            </a:r>
+            <a:r>
+              <a:rPr lang="de-DE" dirty="0"/>
+              <a:t> </a:t>
+            </a:r>
+            <a:r>
+              <a:rPr lang="de-DE" dirty="0" err="1"/>
+              <a:t>of</a:t>
+            </a:r>
+            <a:r>
+              <a:rPr lang="de-DE" dirty="0"/>
+              <a:t> </a:t>
             </a:r>
             <a:r>
               <a:rPr lang="de-DE" dirty="0" err="1"/>
@@ -3885,195 +5050,12 @@
             </a:r>
             <a:r>
               <a:rPr lang="de-DE" dirty="0" err="1"/>
-              <a:t>key</a:t>
+              <a:t>value</a:t>
             </a:r>
             <a:r>
               <a:rPr lang="de-DE" dirty="0"/>
-              <a:t> </a:t>
-            </a:r>
-            <a:r>
-              <a:rPr lang="de-DE" dirty="0" err="1"/>
-              <a:t>and</a:t>
-            </a:r>
-            <a:r>
-              <a:rPr lang="de-DE" dirty="0"/>
-              <a:t> </a:t>
-            </a:r>
-            <a:r>
-              <a:rPr lang="de-DE" dirty="0" err="1"/>
-              <a:t>set</a:t>
-            </a:r>
-            <a:r>
-              <a:rPr lang="de-DE" dirty="0"/>
-              <a:t> </a:t>
-            </a:r>
-            <a:r>
-              <a:rPr lang="de-DE" dirty="0" err="1"/>
-              <a:t>of</a:t>
-            </a:r>
-            <a:r>
-              <a:rPr lang="de-DE" dirty="0"/>
-              <a:t> Proteoms </a:t>
-            </a:r>
-            <a:r>
-              <a:rPr lang="de-DE" dirty="0" err="1"/>
-              <a:t>as</a:t>
-            </a:r>
-            <a:r>
-              <a:rPr lang="de-DE" dirty="0"/>
-              <a:t> Value)</a:t>
-            </a:r>
-          </a:p>
-          <a:p>
-            <a:r>
-              <a:rPr lang="de-DE" dirty="0"/>
-              <a:t>Create </a:t>
-            </a:r>
-            <a:r>
-              <a:rPr lang="de-DE" dirty="0" err="1"/>
-              <a:t>Proteom_dict</a:t>
-            </a:r>
-            <a:r>
-              <a:rPr lang="de-DE" dirty="0"/>
-              <a:t> (Proteoms </a:t>
-            </a:r>
-            <a:r>
-              <a:rPr lang="de-DE" dirty="0" err="1"/>
-              <a:t>as</a:t>
-            </a:r>
-            <a:r>
-              <a:rPr lang="de-DE" dirty="0"/>
-              <a:t> </a:t>
-            </a:r>
-            <a:r>
-              <a:rPr lang="de-DE" dirty="0" err="1"/>
-              <a:t>key</a:t>
-            </a:r>
-            <a:r>
-              <a:rPr lang="de-DE" dirty="0"/>
-              <a:t> </a:t>
-            </a:r>
-            <a:r>
-              <a:rPr lang="de-DE" dirty="0" err="1"/>
-              <a:t>and</a:t>
-            </a:r>
-            <a:r>
-              <a:rPr lang="de-DE" dirty="0"/>
-              <a:t> </a:t>
-            </a:r>
-            <a:r>
-              <a:rPr lang="de-DE" dirty="0" err="1"/>
-              <a:t>set</a:t>
-            </a:r>
-            <a:r>
-              <a:rPr lang="de-DE" dirty="0"/>
-              <a:t> </a:t>
-            </a:r>
-            <a:r>
-              <a:rPr lang="de-DE" dirty="0" err="1"/>
-              <a:t>of</a:t>
-            </a:r>
-            <a:r>
-              <a:rPr lang="de-DE" dirty="0"/>
-              <a:t> </a:t>
-            </a:r>
-            <a:r>
-              <a:rPr lang="de-DE" dirty="0" err="1"/>
-              <a:t>UniParc</a:t>
-            </a:r>
-            <a:r>
-              <a:rPr lang="de-DE" dirty="0"/>
-              <a:t> </a:t>
-            </a:r>
-            <a:r>
-              <a:rPr lang="de-DE" dirty="0" err="1"/>
-              <a:t>as</a:t>
-            </a:r>
-            <a:r>
-              <a:rPr lang="de-DE" dirty="0"/>
-              <a:t> Value) </a:t>
-            </a:r>
-          </a:p>
-          <a:p>
-            <a:r>
-              <a:rPr lang="de-DE" dirty="0"/>
-              <a:t>Create </a:t>
-            </a:r>
-            <a:r>
-              <a:rPr lang="de-DE" dirty="0" err="1"/>
-              <a:t>UniProt_dict</a:t>
-            </a:r>
-            <a:r>
-              <a:rPr lang="de-DE" dirty="0"/>
-              <a:t> (</a:t>
-            </a:r>
-            <a:r>
-              <a:rPr lang="de-DE" dirty="0" err="1"/>
-              <a:t>UniParc</a:t>
-            </a:r>
-            <a:r>
-              <a:rPr lang="de-DE" dirty="0"/>
-              <a:t> </a:t>
-            </a:r>
-            <a:r>
-              <a:rPr lang="de-DE" dirty="0" err="1"/>
-              <a:t>as</a:t>
-            </a:r>
-            <a:r>
-              <a:rPr lang="de-DE" dirty="0"/>
-              <a:t> </a:t>
-            </a:r>
-            <a:r>
-              <a:rPr lang="de-DE" dirty="0" err="1"/>
-              <a:t>key</a:t>
-            </a:r>
-            <a:r>
-              <a:rPr lang="de-DE" dirty="0"/>
-              <a:t> </a:t>
-            </a:r>
-            <a:r>
-              <a:rPr lang="de-DE" dirty="0" err="1"/>
-              <a:t>and</a:t>
-            </a:r>
-            <a:r>
-              <a:rPr lang="de-DE" dirty="0"/>
-              <a:t> </a:t>
-            </a:r>
-            <a:r>
-              <a:rPr lang="de-DE" dirty="0" err="1"/>
-              <a:t>set</a:t>
-            </a:r>
-            <a:r>
-              <a:rPr lang="de-DE" dirty="0"/>
-              <a:t> </a:t>
-            </a:r>
-            <a:r>
-              <a:rPr lang="de-DE" dirty="0" err="1"/>
-              <a:t>of</a:t>
-            </a:r>
-            <a:r>
-              <a:rPr lang="de-DE" dirty="0"/>
-              <a:t> </a:t>
-            </a:r>
-            <a:r>
-              <a:rPr lang="de-DE" dirty="0" err="1"/>
-              <a:t>UniProt</a:t>
-            </a:r>
-            <a:r>
-              <a:rPr lang="de-DE" dirty="0"/>
-              <a:t> </a:t>
-            </a:r>
-            <a:r>
-              <a:rPr lang="de-DE" dirty="0" err="1"/>
-              <a:t>as</a:t>
-            </a:r>
-            <a:r>
-              <a:rPr lang="de-DE" dirty="0"/>
-              <a:t> Value)</a:t>
-            </a:r>
-          </a:p>
-          <a:p>
-            <a:endParaRPr lang="de-DE" dirty="0"/>
+              <a:t>) </a:t>
+            </a:r>
           </a:p>
           <a:p>
             <a:pPr marL="0" indent="0">
@@ -4086,6 +5068,72 @@
           </a:p>
         </p:txBody>
       </p:sp>
+      <p:graphicFrame>
+        <p:nvGraphicFramePr>
+          <p:cNvPr id="5" name="Objekt 4">
+            <a:extLst>
+              <a:ext uri="{FF2B5EF4-FFF2-40B4-BE49-F238E27FC236}">
+                <a16:creationId xmlns:a16="http://schemas.microsoft.com/office/drawing/2014/main" id="{67624A97-7370-497D-97A1-981762037A0B}"/>
+              </a:ext>
+            </a:extLst>
+          </p:cNvPr>
+          <p:cNvGraphicFramePr>
+            <a:graphicFrameLocks noChangeAspect="1"/>
+          </p:cNvGraphicFramePr>
+          <p:nvPr>
+            <p:extLst>
+              <p:ext uri="{D42A27DB-BD31-4B8C-83A1-F6EECF244321}">
+                <p14:modId xmlns:p14="http://schemas.microsoft.com/office/powerpoint/2010/main" val="800628402"/>
+              </p:ext>
+            </p:extLst>
+          </p:nvPr>
+        </p:nvGraphicFramePr>
+        <p:xfrm>
+          <a:off x="4962525" y="719138"/>
+          <a:ext cx="6303963" cy="5362575"/>
+        </p:xfrm>
+        <a:graphic>
+          <a:graphicData uri="http://schemas.openxmlformats.org/presentationml/2006/ole">
+            <mc:AlternateContent xmlns:mc="http://schemas.openxmlformats.org/markup-compatibility/2006">
+              <mc:Choice xmlns:v="urn:schemas-microsoft-com:vml" Requires="v">
+                <p:oleObj spid="_x0000_s2052" name="Document" r:id="rId3" imgW="9807617" imgH="8363253" progId="Word.Document.12">
+                  <p:embed/>
+                </p:oleObj>
+              </mc:Choice>
+              <mc:Fallback>
+                <p:oleObj name="Document" r:id="rId3" imgW="9807617" imgH="8363253" progId="Word.Document.12">
+                  <p:embed/>
+                  <p:pic>
+                    <p:nvPicPr>
+                      <p:cNvPr id="0" name=""/>
+                      <p:cNvPicPr/>
+                      <p:nvPr/>
+                    </p:nvPicPr>
+                    <p:blipFill>
+                      <a:blip r:embed="rId4"/>
+                      <a:stretch>
+                        <a:fillRect/>
+                      </a:stretch>
+                    </p:blipFill>
+                    <p:spPr>
+                      <a:xfrm>
+                        <a:off x="4962525" y="719138"/>
+                        <a:ext cx="6303963" cy="5362575"/>
+                      </a:xfrm>
+                      <a:prstGeom prst="rect">
+                        <a:avLst/>
+                      </a:prstGeom>
+                      <a:solidFill>
+                        <a:schemeClr val="bg1"/>
+                      </a:solidFill>
+                    </p:spPr>
+                  </p:pic>
+                </p:oleObj>
+              </mc:Fallback>
+            </mc:AlternateContent>
+          </a:graphicData>
+        </a:graphic>
+      </p:graphicFrame>
     </p:spTree>
     <p:extLst>
       <p:ext uri="{BB962C8B-B14F-4D97-AF65-F5344CB8AC3E}">
@@ -4168,8 +5216,8 @@
         </p:nvSpPr>
         <p:spPr>
           <a:xfrm>
-            <a:off x="838200" y="0"/>
-            <a:ext cx="10515600" cy="1325563"/>
+            <a:off x="0" y="-118753"/>
+            <a:ext cx="5218216" cy="1325563"/>
           </a:xfrm>
         </p:spPr>
         <p:txBody>
@@ -4177,22 +5225,21 @@
           <a:lstStyle/>
           <a:p>
             <a:r>
+              <a:rPr lang="de-DE" dirty="0" err="1"/>
+              <a:t>reduce</a:t>
+            </a:r>
+            <a:r>
               <a:rPr lang="de-DE" dirty="0"/>
-              <a:t>Workflow </a:t>
+              <a:t> # </a:t>
             </a:r>
             <a:r>
               <a:rPr lang="de-DE" dirty="0" err="1"/>
-              <a:t>data</a:t>
+              <a:t>of</a:t>
             </a:r>
             <a:r>
               <a:rPr lang="de-DE" dirty="0"/>
-              <a:t> </a:t>
-            </a:r>
-            <a:r>
-              <a:rPr lang="de-DE" dirty="0" err="1"/>
-              <a:t>reduction</a:t>
-            </a:r>
-            <a:endParaRPr lang="de-DE" dirty="0"/>
+              <a:t> Proteoms</a:t>
+            </a:r>
           </a:p>
         </p:txBody>
       </p:sp>
@@ -4214,89 +5261,29 @@
         </p:nvSpPr>
         <p:spPr>
           <a:xfrm>
-            <a:off x="838200" y="1104406"/>
-            <a:ext cx="10515600" cy="5153890"/>
+            <a:off x="249382" y="1104406"/>
+            <a:ext cx="3265714" cy="5153890"/>
           </a:xfrm>
         </p:spPr>
         <p:txBody>
           <a:bodyPr>
-            <a:normAutofit fontScale="55000" lnSpcReduction="20000"/>
+            <a:normAutofit/>
           </a:bodyPr>
           <a:lstStyle/>
           <a:p>
-            <a:pPr marL="0" indent="0">
-              <a:buNone/>
-            </a:pPr>
             <a:r>
               <a:rPr lang="de-DE" dirty="0" err="1">
-                <a:solidFill>
-                  <a:schemeClr val="accent1">
-                    <a:lumMod val="50000"/>
-                  </a:schemeClr>
-                </a:solidFill>
                 <a:latin typeface="Courier New" panose="02070309020205020404" pitchFamily="49" charset="0"/>
                 <a:cs typeface="Courier New" panose="02070309020205020404" pitchFamily="49" charset="0"/>
               </a:rPr>
-              <a:t>UniParc_dict</a:t>
+              <a:t>more</a:t>
             </a:r>
             <a:r>
               <a:rPr lang="de-DE" dirty="0">
                 <a:latin typeface="Courier New" panose="02070309020205020404" pitchFamily="49" charset="0"/>
                 <a:cs typeface="Courier New" panose="02070309020205020404" pitchFamily="49" charset="0"/>
               </a:rPr>
-              <a:t>= (</a:t>
-            </a:r>
-            <a:r>
-              <a:rPr lang="de-DE" dirty="0" err="1">
-                <a:latin typeface="Courier New" panose="02070309020205020404" pitchFamily="49" charset="0"/>
-                <a:cs typeface="Courier New" panose="02070309020205020404" pitchFamily="49" charset="0"/>
-              </a:rPr>
-              <a:t>key:UniParc,value:set</a:t>
-            </a:r>
-            <a:r>
-              <a:rPr lang="de-DE" dirty="0">
-                <a:latin typeface="Courier New" panose="02070309020205020404" pitchFamily="49" charset="0"/>
-                <a:cs typeface="Courier New" panose="02070309020205020404" pitchFamily="49" charset="0"/>
-              </a:rPr>
-              <a:t>(Proteoms)</a:t>
-            </a:r>
-          </a:p>
-          <a:p>
-            <a:pPr marL="0" indent="0">
-              <a:buNone/>
-            </a:pPr>
-            <a:r>
-              <a:rPr lang="de-DE" dirty="0" err="1">
-                <a:solidFill>
-                  <a:schemeClr val="accent1">
-                    <a:lumMod val="50000"/>
-                  </a:schemeClr>
-                </a:solidFill>
-                <a:latin typeface="Courier New" panose="02070309020205020404" pitchFamily="49" charset="0"/>
-                <a:cs typeface="Courier New" panose="02070309020205020404" pitchFamily="49" charset="0"/>
-              </a:rPr>
-              <a:t>Proteome_dict</a:t>
-            </a:r>
-            <a:r>
-              <a:rPr lang="de-DE" dirty="0">
-                <a:latin typeface="Courier New" panose="02070309020205020404" pitchFamily="49" charset="0"/>
-                <a:cs typeface="Courier New" panose="02070309020205020404" pitchFamily="49" charset="0"/>
-              </a:rPr>
-              <a:t>= (</a:t>
-            </a:r>
-            <a:r>
-              <a:rPr lang="de-DE" dirty="0" err="1">
-                <a:latin typeface="Courier New" panose="02070309020205020404" pitchFamily="49" charset="0"/>
-                <a:cs typeface="Courier New" panose="02070309020205020404" pitchFamily="49" charset="0"/>
-              </a:rPr>
-              <a:t>key:Proteome,value:set</a:t>
-            </a:r>
-            <a:r>
-              <a:rPr lang="de-DE" dirty="0">
-                <a:latin typeface="Courier New" panose="02070309020205020404" pitchFamily="49" charset="0"/>
-                <a:cs typeface="Courier New" panose="02070309020205020404" pitchFamily="49" charset="0"/>
-              </a:rPr>
-              <a:t>(</a:t>
+              <a:t> </a:t>
             </a:r>
             <a:r>
               <a:rPr lang="de-DE" dirty="0" err="1">
@@ -4310,326 +5297,28 @@
                 <a:latin typeface="Courier New" panose="02070309020205020404" pitchFamily="49" charset="0"/>
                 <a:cs typeface="Courier New" panose="02070309020205020404" pitchFamily="49" charset="0"/>
               </a:rPr>
-              <a:t>)</a:t>
-            </a:r>
-          </a:p>
-          <a:p>
-            <a:pPr marL="0" indent="0">
-              <a:buNone/>
-            </a:pPr>
+              <a:t> ID per </a:t>
+            </a:r>
             <a:r>
               <a:rPr lang="de-DE" dirty="0" err="1">
-                <a:solidFill>
-                  <a:schemeClr val="accent1">
-                    <a:lumMod val="50000"/>
-                  </a:schemeClr>
-                </a:solidFill>
                 <a:latin typeface="Courier New" panose="02070309020205020404" pitchFamily="49" charset="0"/>
                 <a:cs typeface="Courier New" panose="02070309020205020404" pitchFamily="49" charset="0"/>
               </a:rPr>
-              <a:t>Required_proteoms</a:t>
+              <a:t>proteom</a:t>
             </a:r>
             <a:r>
               <a:rPr lang="de-DE" dirty="0">
                 <a:latin typeface="Courier New" panose="02070309020205020404" pitchFamily="49" charset="0"/>
                 <a:cs typeface="Courier New" panose="02070309020205020404" pitchFamily="49" charset="0"/>
               </a:rPr>
-              <a:t>=</a:t>
+              <a:t>  </a:t>
             </a:r>
             <a:r>
               <a:rPr lang="de-DE" dirty="0" err="1">
                 <a:latin typeface="Courier New" panose="02070309020205020404" pitchFamily="49" charset="0"/>
                 <a:cs typeface="Courier New" panose="02070309020205020404" pitchFamily="49" charset="0"/>
               </a:rPr>
-              <a:t>list</a:t>
-            </a:r>
-            <a:r>
-              <a:rPr lang="de-DE" dirty="0">
-                <a:latin typeface="Courier New" panose="02070309020205020404" pitchFamily="49" charset="0"/>
-                <a:cs typeface="Courier New" panose="02070309020205020404" pitchFamily="49" charset="0"/>
-              </a:rPr>
-              <a:t>()</a:t>
-            </a:r>
-          </a:p>
-          <a:p>
-            <a:pPr marL="0" indent="0">
-              <a:buNone/>
-            </a:pPr>
-            <a:r>
-              <a:rPr lang="de-DE" b="1" dirty="0" err="1">
-                <a:latin typeface="Courier New" panose="02070309020205020404" pitchFamily="49" charset="0"/>
-                <a:cs typeface="Courier New" panose="02070309020205020404" pitchFamily="49" charset="0"/>
-              </a:rPr>
-              <a:t>while</a:t>
-            </a:r>
-            <a:r>
-              <a:rPr lang="de-DE" b="1" dirty="0">
-                <a:latin typeface="Courier New" panose="02070309020205020404" pitchFamily="49" charset="0"/>
-                <a:cs typeface="Courier New" panose="02070309020205020404" pitchFamily="49" charset="0"/>
-              </a:rPr>
-              <a:t>(#</a:t>
-            </a:r>
-            <a:r>
-              <a:rPr lang="de-DE" b="1" dirty="0" err="1">
-                <a:latin typeface="Courier New" panose="02070309020205020404" pitchFamily="49" charset="0"/>
-                <a:cs typeface="Courier New" panose="02070309020205020404" pitchFamily="49" charset="0"/>
-              </a:rPr>
-              <a:t>elements</a:t>
-            </a:r>
-            <a:r>
-              <a:rPr lang="de-DE" dirty="0">
-                <a:latin typeface="Courier New" panose="02070309020205020404" pitchFamily="49" charset="0"/>
-                <a:cs typeface="Courier New" panose="02070309020205020404" pitchFamily="49" charset="0"/>
-              </a:rPr>
-              <a:t>(</a:t>
-            </a:r>
-            <a:r>
-              <a:rPr lang="de-DE" dirty="0" err="1">
-                <a:solidFill>
-                  <a:schemeClr val="accent1">
-                    <a:lumMod val="50000"/>
-                  </a:schemeClr>
-                </a:solidFill>
-                <a:latin typeface="Courier New" panose="02070309020205020404" pitchFamily="49" charset="0"/>
-                <a:cs typeface="Courier New" panose="02070309020205020404" pitchFamily="49" charset="0"/>
-              </a:rPr>
-              <a:t>Proteome_dict</a:t>
-            </a:r>
-            <a:r>
-              <a:rPr lang="de-DE" dirty="0">
-                <a:latin typeface="Courier New" panose="02070309020205020404" pitchFamily="49" charset="0"/>
-                <a:cs typeface="Courier New" panose="02070309020205020404" pitchFamily="49" charset="0"/>
-              </a:rPr>
-              <a:t>)&gt;0):</a:t>
-            </a:r>
-          </a:p>
-          <a:p>
-            <a:pPr marL="0" indent="0">
-              <a:buNone/>
-            </a:pPr>
-            <a:r>
-              <a:rPr lang="de-DE" dirty="0">
-                <a:latin typeface="Courier New" panose="02070309020205020404" pitchFamily="49" charset="0"/>
-                <a:cs typeface="Courier New" panose="02070309020205020404" pitchFamily="49" charset="0"/>
-              </a:rPr>
-              <a:t>	p=</a:t>
-            </a:r>
-            <a:r>
-              <a:rPr lang="de-DE" b="1" dirty="0" err="1">
-                <a:latin typeface="Courier New" panose="02070309020205020404" pitchFamily="49" charset="0"/>
-                <a:cs typeface="Courier New" panose="02070309020205020404" pitchFamily="49" charset="0"/>
-              </a:rPr>
-              <a:t>minSet</a:t>
-            </a:r>
-            <a:r>
-              <a:rPr lang="de-DE" dirty="0">
-                <a:latin typeface="Courier New" panose="02070309020205020404" pitchFamily="49" charset="0"/>
-                <a:cs typeface="Courier New" panose="02070309020205020404" pitchFamily="49" charset="0"/>
-              </a:rPr>
-              <a:t>(</a:t>
-            </a:r>
-            <a:r>
-              <a:rPr lang="de-DE" dirty="0" err="1">
-                <a:solidFill>
-                  <a:schemeClr val="accent1">
-                    <a:lumMod val="50000"/>
-                  </a:schemeClr>
-                </a:solidFill>
-                <a:latin typeface="Courier New" panose="02070309020205020404" pitchFamily="49" charset="0"/>
-                <a:cs typeface="Courier New" panose="02070309020205020404" pitchFamily="49" charset="0"/>
-              </a:rPr>
-              <a:t>Proteome_dict</a:t>
-            </a:r>
-            <a:r>
-              <a:rPr lang="de-DE" dirty="0">
-                <a:latin typeface="Courier New" panose="02070309020205020404" pitchFamily="49" charset="0"/>
-                <a:cs typeface="Courier New" panose="02070309020205020404" pitchFamily="49" charset="0"/>
-              </a:rPr>
-              <a:t>)</a:t>
-            </a:r>
-          </a:p>
-          <a:p>
-            <a:pPr marL="0" indent="0">
-              <a:buNone/>
-            </a:pPr>
-            <a:r>
-              <a:rPr lang="de-DE" dirty="0">
-                <a:latin typeface="Courier New" panose="02070309020205020404" pitchFamily="49" charset="0"/>
-                <a:cs typeface="Courier New" panose="02070309020205020404" pitchFamily="49" charset="0"/>
-              </a:rPr>
-              <a:t>	b=True</a:t>
-            </a:r>
-          </a:p>
-          <a:p>
-            <a:pPr marL="0" indent="0">
-              <a:buNone/>
-            </a:pPr>
-            <a:r>
-              <a:rPr lang="de-DE" dirty="0">
-                <a:latin typeface="Courier New" panose="02070309020205020404" pitchFamily="49" charset="0"/>
-                <a:cs typeface="Courier New" panose="02070309020205020404" pitchFamily="49" charset="0"/>
-              </a:rPr>
-              <a:t>	</a:t>
-            </a:r>
-            <a:r>
-              <a:rPr lang="en-US" b="1" dirty="0">
-                <a:latin typeface="Courier New" panose="02070309020205020404" pitchFamily="49" charset="0"/>
-                <a:cs typeface="Courier New" panose="02070309020205020404" pitchFamily="49" charset="0"/>
-              </a:rPr>
-              <a:t>for</a:t>
-            </a:r>
-            <a:r>
-              <a:rPr lang="de-DE" dirty="0">
-                <a:latin typeface="Courier New" panose="02070309020205020404" pitchFamily="49" charset="0"/>
-                <a:cs typeface="Courier New" panose="02070309020205020404" pitchFamily="49" charset="0"/>
-              </a:rPr>
-              <a:t> (e in </a:t>
-            </a:r>
-            <a:r>
-              <a:rPr lang="de-DE" dirty="0" err="1">
-                <a:solidFill>
-                  <a:schemeClr val="accent1">
-                    <a:lumMod val="50000"/>
-                  </a:schemeClr>
-                </a:solidFill>
-                <a:latin typeface="Courier New" panose="02070309020205020404" pitchFamily="49" charset="0"/>
-                <a:cs typeface="Courier New" panose="02070309020205020404" pitchFamily="49" charset="0"/>
-              </a:rPr>
-              <a:t>Proteome_dict</a:t>
-            </a:r>
-            <a:r>
-              <a:rPr lang="de-DE" dirty="0">
-                <a:latin typeface="Courier New" panose="02070309020205020404" pitchFamily="49" charset="0"/>
-                <a:cs typeface="Courier New" panose="02070309020205020404" pitchFamily="49" charset="0"/>
-              </a:rPr>
-              <a:t>[p]):</a:t>
-            </a:r>
-          </a:p>
-          <a:p>
-            <a:pPr marL="0" indent="0">
-              <a:buNone/>
-            </a:pPr>
-            <a:r>
-              <a:rPr lang="de-DE" dirty="0">
-                <a:latin typeface="Courier New" panose="02070309020205020404" pitchFamily="49" charset="0"/>
-                <a:cs typeface="Courier New" panose="02070309020205020404" pitchFamily="49" charset="0"/>
-              </a:rPr>
-              <a:t>		 </a:t>
-            </a:r>
-            <a:r>
-              <a:rPr lang="de-DE" dirty="0" err="1">
-                <a:latin typeface="Courier New" panose="02070309020205020404" pitchFamily="49" charset="0"/>
-                <a:cs typeface="Courier New" panose="02070309020205020404" pitchFamily="49" charset="0"/>
-              </a:rPr>
-              <a:t>if</a:t>
-            </a:r>
-            <a:r>
-              <a:rPr lang="de-DE" dirty="0">
-                <a:latin typeface="Courier New" panose="02070309020205020404" pitchFamily="49" charset="0"/>
-                <a:cs typeface="Courier New" panose="02070309020205020404" pitchFamily="49" charset="0"/>
-              </a:rPr>
-              <a:t>(</a:t>
-            </a:r>
-            <a:r>
-              <a:rPr lang="de-DE" b="1" dirty="0" err="1">
-                <a:latin typeface="Courier New" panose="02070309020205020404" pitchFamily="49" charset="0"/>
-                <a:cs typeface="Courier New" panose="02070309020205020404" pitchFamily="49" charset="0"/>
-              </a:rPr>
-              <a:t>length</a:t>
-            </a:r>
-            <a:r>
-              <a:rPr lang="de-DE" dirty="0">
-                <a:latin typeface="Courier New" panose="02070309020205020404" pitchFamily="49" charset="0"/>
-                <a:cs typeface="Courier New" panose="02070309020205020404" pitchFamily="49" charset="0"/>
-              </a:rPr>
-              <a:t>(</a:t>
-            </a:r>
-            <a:r>
-              <a:rPr lang="de-DE" dirty="0" err="1">
-                <a:solidFill>
-                  <a:schemeClr val="accent1">
-                    <a:lumMod val="50000"/>
-                  </a:schemeClr>
-                </a:solidFill>
-                <a:latin typeface="Courier New" panose="02070309020205020404" pitchFamily="49" charset="0"/>
-                <a:cs typeface="Courier New" panose="02070309020205020404" pitchFamily="49" charset="0"/>
-              </a:rPr>
-              <a:t>UniParc_dict</a:t>
-            </a:r>
-            <a:r>
-              <a:rPr lang="de-DE" dirty="0">
-                <a:latin typeface="Courier New" panose="02070309020205020404" pitchFamily="49" charset="0"/>
-                <a:cs typeface="Courier New" panose="02070309020205020404" pitchFamily="49" charset="0"/>
-              </a:rPr>
-              <a:t>[e]&lt;=1)):</a:t>
-            </a:r>
-          </a:p>
-          <a:p>
-            <a:pPr marL="0" indent="0">
-              <a:buNone/>
-            </a:pPr>
-            <a:r>
-              <a:rPr lang="de-DE" dirty="0">
-                <a:latin typeface="Courier New" panose="02070309020205020404" pitchFamily="49" charset="0"/>
-                <a:cs typeface="Courier New" panose="02070309020205020404" pitchFamily="49" charset="0"/>
-              </a:rPr>
-              <a:t>			b=</a:t>
-            </a:r>
-            <a:r>
-              <a:rPr lang="de-DE" dirty="0" err="1">
-                <a:latin typeface="Courier New" panose="02070309020205020404" pitchFamily="49" charset="0"/>
-                <a:cs typeface="Courier New" panose="02070309020205020404" pitchFamily="49" charset="0"/>
-              </a:rPr>
-              <a:t>False</a:t>
-            </a:r>
-            <a:endParaRPr lang="de-DE" dirty="0">
-              <a:latin typeface="Courier New" panose="02070309020205020404" pitchFamily="49" charset="0"/>
-              <a:cs typeface="Courier New" panose="02070309020205020404" pitchFamily="49" charset="0"/>
-            </a:endParaRPr>
-          </a:p>
-          <a:p>
-            <a:pPr marL="0" indent="0">
-              <a:buNone/>
-            </a:pPr>
-            <a:r>
-              <a:rPr lang="de-DE" dirty="0">
-                <a:latin typeface="Courier New" panose="02070309020205020404" pitchFamily="49" charset="0"/>
-                <a:cs typeface="Courier New" panose="02070309020205020404" pitchFamily="49" charset="0"/>
-              </a:rPr>
-              <a:t>			break</a:t>
-            </a:r>
-          </a:p>
-          <a:p>
-            <a:pPr marL="0" indent="0">
-              <a:buNone/>
-            </a:pPr>
-            <a:r>
-              <a:rPr lang="de-DE" dirty="0">
-                <a:latin typeface="Courier New" panose="02070309020205020404" pitchFamily="49" charset="0"/>
-                <a:cs typeface="Courier New" panose="02070309020205020404" pitchFamily="49" charset="0"/>
-              </a:rPr>
-              <a:t>	</a:t>
-            </a:r>
-            <a:r>
-              <a:rPr lang="de-DE" b="1" dirty="0" err="1">
-                <a:latin typeface="Courier New" panose="02070309020205020404" pitchFamily="49" charset="0"/>
-                <a:cs typeface="Courier New" panose="02070309020205020404" pitchFamily="49" charset="0"/>
-              </a:rPr>
-              <a:t>if</a:t>
-            </a:r>
-            <a:r>
-              <a:rPr lang="de-DE" dirty="0">
-                <a:latin typeface="Courier New" panose="02070309020205020404" pitchFamily="49" charset="0"/>
-                <a:cs typeface="Courier New" panose="02070309020205020404" pitchFamily="49" charset="0"/>
-              </a:rPr>
-              <a:t>(b): //Proteom </a:t>
-            </a:r>
-            <a:r>
-              <a:rPr lang="de-DE" dirty="0" err="1">
-                <a:latin typeface="Courier New" panose="02070309020205020404" pitchFamily="49" charset="0"/>
-                <a:cs typeface="Courier New" panose="02070309020205020404" pitchFamily="49" charset="0"/>
-              </a:rPr>
-              <a:t>can</a:t>
+              <a:t>more</a:t>
             </a:r>
             <a:r>
               <a:rPr lang="de-DE" dirty="0">
@@ -4643,7 +5332,20 @@
                 <a:latin typeface="Courier New" panose="02070309020205020404" pitchFamily="49" charset="0"/>
                 <a:cs typeface="Courier New" panose="02070309020205020404" pitchFamily="49" charset="0"/>
               </a:rPr>
-              <a:t>be</a:t>
+              <a:t>information</a:t>
+            </a:r>
+            <a:endParaRPr lang="de-DE" dirty="0">
+              <a:latin typeface="Courier New" panose="02070309020205020404" pitchFamily="49" charset="0"/>
+              <a:cs typeface="Courier New" panose="02070309020205020404" pitchFamily="49" charset="0"/>
+            </a:endParaRPr>
+          </a:p>
+          <a:p>
+            <a:r>
+              <a:rPr lang="de-DE" dirty="0" err="1">
+                <a:latin typeface="Courier New" panose="02070309020205020404" pitchFamily="49" charset="0"/>
+                <a:cs typeface="Courier New" panose="02070309020205020404" pitchFamily="49" charset="0"/>
+              </a:rPr>
+              <a:t>add</a:t>
             </a:r>
             <a:r>
               <a:rPr lang="de-DE" dirty="0">
@@ -4657,63 +5359,7 @@
                 <a:latin typeface="Courier New" panose="02070309020205020404" pitchFamily="49" charset="0"/>
                 <a:cs typeface="Courier New" panose="02070309020205020404" pitchFamily="49" charset="0"/>
               </a:rPr>
-              <a:t>removed</a:t>
-            </a:r>
-            <a:endParaRPr lang="de-DE" dirty="0">
-              <a:latin typeface="Courier New" panose="02070309020205020404" pitchFamily="49" charset="0"/>
-              <a:cs typeface="Courier New" panose="02070309020205020404" pitchFamily="49" charset="0"/>
-            </a:endParaRPr>
-          </a:p>
-          <a:p>
-            <a:pPr marL="0" indent="0">
-              <a:buNone/>
-            </a:pPr>
-            <a:r>
-              <a:rPr lang="de-DE" dirty="0">
-                <a:latin typeface="Courier New" panose="02070309020205020404" pitchFamily="49" charset="0"/>
-                <a:cs typeface="Courier New" panose="02070309020205020404" pitchFamily="49" charset="0"/>
-              </a:rPr>
-              <a:t>		 </a:t>
-            </a:r>
-            <a:r>
-              <a:rPr lang="de-DE" b="1" dirty="0" err="1">
-                <a:latin typeface="Courier New" panose="02070309020205020404" pitchFamily="49" charset="0"/>
-                <a:cs typeface="Courier New" panose="02070309020205020404" pitchFamily="49" charset="0"/>
-              </a:rPr>
-              <a:t>for</a:t>
-            </a:r>
-            <a:r>
-              <a:rPr lang="de-DE" dirty="0">
-                <a:latin typeface="Courier New" panose="02070309020205020404" pitchFamily="49" charset="0"/>
-                <a:cs typeface="Courier New" panose="02070309020205020404" pitchFamily="49" charset="0"/>
-              </a:rPr>
-              <a:t> (e in </a:t>
-            </a:r>
-            <a:r>
-              <a:rPr lang="de-DE" dirty="0" err="1">
-                <a:solidFill>
-                  <a:schemeClr val="accent1">
-                    <a:lumMod val="50000"/>
-                  </a:schemeClr>
-                </a:solidFill>
-                <a:latin typeface="Courier New" panose="02070309020205020404" pitchFamily="49" charset="0"/>
-                <a:cs typeface="Courier New" panose="02070309020205020404" pitchFamily="49" charset="0"/>
-              </a:rPr>
-              <a:t>Proteome_dict</a:t>
-            </a:r>
-            <a:r>
-              <a:rPr lang="de-DE" dirty="0">
-                <a:latin typeface="Courier New" panose="02070309020205020404" pitchFamily="49" charset="0"/>
-                <a:cs typeface="Courier New" panose="02070309020205020404" pitchFamily="49" charset="0"/>
-              </a:rPr>
-              <a:t>[p]):	 // Remove P </a:t>
-            </a:r>
-            <a:r>
-              <a:rPr lang="de-DE" dirty="0" err="1">
-                <a:latin typeface="Courier New" panose="02070309020205020404" pitchFamily="49" charset="0"/>
-                <a:cs typeface="Courier New" panose="02070309020205020404" pitchFamily="49" charset="0"/>
-              </a:rPr>
-              <a:t>from</a:t>
+              <a:t>biggest</a:t>
             </a:r>
             <a:r>
               <a:rPr lang="de-DE" dirty="0">
@@ -4727,7 +5373,7 @@
                 <a:latin typeface="Courier New" panose="02070309020205020404" pitchFamily="49" charset="0"/>
                 <a:cs typeface="Courier New" panose="02070309020205020404" pitchFamily="49" charset="0"/>
               </a:rPr>
-              <a:t>each</a:t>
+              <a:t>proteom</a:t>
             </a:r>
             <a:r>
               <a:rPr lang="de-DE" dirty="0">
@@ -4741,7 +5387,7 @@
                 <a:latin typeface="Courier New" panose="02070309020205020404" pitchFamily="49" charset="0"/>
                 <a:cs typeface="Courier New" panose="02070309020205020404" pitchFamily="49" charset="0"/>
               </a:rPr>
-              <a:t>affected</a:t>
+              <a:t>to</a:t>
             </a:r>
             <a:r>
               <a:rPr lang="de-DE" dirty="0">
@@ -4755,151 +5401,7 @@
                 <a:latin typeface="Courier New" panose="02070309020205020404" pitchFamily="49" charset="0"/>
                 <a:cs typeface="Courier New" panose="02070309020205020404" pitchFamily="49" charset="0"/>
               </a:rPr>
-              <a:t>UniParc</a:t>
-            </a:r>
-            <a:endParaRPr lang="de-DE" dirty="0">
-              <a:latin typeface="Courier New" panose="02070309020205020404" pitchFamily="49" charset="0"/>
-              <a:cs typeface="Courier New" panose="02070309020205020404" pitchFamily="49" charset="0"/>
-            </a:endParaRPr>
-          </a:p>
-          <a:p>
-            <a:pPr marL="0" indent="0">
-              <a:buNone/>
-            </a:pPr>
-            <a:r>
-              <a:rPr lang="de-DE" dirty="0">
-                <a:latin typeface="Courier New" panose="02070309020205020404" pitchFamily="49" charset="0"/>
-                <a:cs typeface="Courier New" panose="02070309020205020404" pitchFamily="49" charset="0"/>
-              </a:rPr>
-              <a:t>			</a:t>
-            </a:r>
-            <a:r>
-              <a:rPr lang="de-DE" dirty="0" err="1">
-                <a:solidFill>
-                  <a:schemeClr val="accent1">
-                    <a:lumMod val="50000"/>
-                  </a:schemeClr>
-                </a:solidFill>
-                <a:latin typeface="Courier New" panose="02070309020205020404" pitchFamily="49" charset="0"/>
-                <a:cs typeface="Courier New" panose="02070309020205020404" pitchFamily="49" charset="0"/>
-              </a:rPr>
-              <a:t>UniParc_dict</a:t>
-            </a:r>
-            <a:r>
-              <a:rPr lang="de-DE" dirty="0">
-                <a:latin typeface="Courier New" panose="02070309020205020404" pitchFamily="49" charset="0"/>
-                <a:cs typeface="Courier New" panose="02070309020205020404" pitchFamily="49" charset="0"/>
-              </a:rPr>
-              <a:t>[e].</a:t>
-            </a:r>
-            <a:r>
-              <a:rPr lang="de-DE" b="1" dirty="0" err="1">
-                <a:latin typeface="Courier New" panose="02070309020205020404" pitchFamily="49" charset="0"/>
-                <a:cs typeface="Courier New" panose="02070309020205020404" pitchFamily="49" charset="0"/>
-              </a:rPr>
-              <a:t>remove</a:t>
-            </a:r>
-            <a:r>
-              <a:rPr lang="de-DE" dirty="0">
-                <a:latin typeface="Courier New" panose="02070309020205020404" pitchFamily="49" charset="0"/>
-                <a:cs typeface="Courier New" panose="02070309020205020404" pitchFamily="49" charset="0"/>
-              </a:rPr>
-              <a:t>(p)</a:t>
-            </a:r>
-          </a:p>
-          <a:p>
-            <a:pPr marL="0" indent="0">
-              <a:buNone/>
-            </a:pPr>
-            <a:r>
-              <a:rPr lang="de-DE" dirty="0">
-                <a:latin typeface="Courier New" panose="02070309020205020404" pitchFamily="49" charset="0"/>
-                <a:cs typeface="Courier New" panose="02070309020205020404" pitchFamily="49" charset="0"/>
-              </a:rPr>
-              <a:t>	</a:t>
-            </a:r>
-            <a:r>
-              <a:rPr lang="de-DE" b="1" dirty="0" err="1">
-                <a:latin typeface="Courier New" panose="02070309020205020404" pitchFamily="49" charset="0"/>
-                <a:cs typeface="Courier New" panose="02070309020205020404" pitchFamily="49" charset="0"/>
-              </a:rPr>
-              <a:t>else</a:t>
-            </a:r>
-            <a:r>
-              <a:rPr lang="de-DE" dirty="0">
-                <a:latin typeface="Courier New" panose="02070309020205020404" pitchFamily="49" charset="0"/>
-                <a:cs typeface="Courier New" panose="02070309020205020404" pitchFamily="49" charset="0"/>
-              </a:rPr>
-              <a:t>:</a:t>
-            </a:r>
-          </a:p>
-          <a:p>
-            <a:pPr marL="0" indent="0">
-              <a:buNone/>
-            </a:pPr>
-            <a:r>
-              <a:rPr lang="de-DE" dirty="0">
-                <a:latin typeface="Courier New" panose="02070309020205020404" pitchFamily="49" charset="0"/>
-                <a:cs typeface="Courier New" panose="02070309020205020404" pitchFamily="49" charset="0"/>
-              </a:rPr>
-              <a:t>		</a:t>
-            </a:r>
-            <a:r>
-              <a:rPr lang="de-DE" dirty="0" err="1">
-                <a:solidFill>
-                  <a:schemeClr val="accent1">
-                    <a:lumMod val="50000"/>
-                  </a:schemeClr>
-                </a:solidFill>
-                <a:latin typeface="Courier New" panose="02070309020205020404" pitchFamily="49" charset="0"/>
-                <a:cs typeface="Courier New" panose="02070309020205020404" pitchFamily="49" charset="0"/>
-              </a:rPr>
-              <a:t>Required_proteoms.</a:t>
-            </a:r>
-            <a:r>
-              <a:rPr lang="de-DE" b="1" dirty="0" err="1">
-                <a:latin typeface="Courier New" panose="02070309020205020404" pitchFamily="49" charset="0"/>
-                <a:cs typeface="Courier New" panose="02070309020205020404" pitchFamily="49" charset="0"/>
-              </a:rPr>
-              <a:t>append</a:t>
-            </a:r>
-            <a:r>
-              <a:rPr lang="de-DE" dirty="0">
-                <a:solidFill>
-                  <a:schemeClr val="accent1">
-                    <a:lumMod val="50000"/>
-                  </a:schemeClr>
-                </a:solidFill>
-                <a:latin typeface="Courier New" panose="02070309020205020404" pitchFamily="49" charset="0"/>
-                <a:cs typeface="Courier New" panose="02070309020205020404" pitchFamily="49" charset="0"/>
-              </a:rPr>
-              <a:t>((</a:t>
-            </a:r>
-            <a:r>
-              <a:rPr lang="de-DE" dirty="0" err="1">
-                <a:solidFill>
-                  <a:schemeClr val="accent1">
-                    <a:lumMod val="50000"/>
-                  </a:schemeClr>
-                </a:solidFill>
-                <a:latin typeface="Courier New" panose="02070309020205020404" pitchFamily="49" charset="0"/>
-                <a:cs typeface="Courier New" panose="02070309020205020404" pitchFamily="49" charset="0"/>
-              </a:rPr>
-              <a:t>p,Proteome_dict</a:t>
-            </a:r>
-            <a:r>
-              <a:rPr lang="de-DE" dirty="0">
-                <a:latin typeface="Courier New" panose="02070309020205020404" pitchFamily="49" charset="0"/>
-                <a:cs typeface="Courier New" panose="02070309020205020404" pitchFamily="49" charset="0"/>
-              </a:rPr>
-              <a:t>[p])) // Add p </a:t>
-            </a:r>
-            <a:r>
-              <a:rPr lang="de-DE" dirty="0" err="1">
-                <a:latin typeface="Courier New" panose="02070309020205020404" pitchFamily="49" charset="0"/>
-                <a:cs typeface="Courier New" panose="02070309020205020404" pitchFamily="49" charset="0"/>
-              </a:rPr>
-              <a:t>to</a:t>
+              <a:t>nessecary</a:t>
             </a:r>
             <a:r>
               <a:rPr lang="de-DE" dirty="0">
@@ -4913,103 +5415,87 @@
                 <a:latin typeface="Courier New" panose="02070309020205020404" pitchFamily="49" charset="0"/>
                 <a:cs typeface="Courier New" panose="02070309020205020404" pitchFamily="49" charset="0"/>
               </a:rPr>
-              <a:t>required</a:t>
-            </a:r>
-            <a:r>
-              <a:rPr lang="de-DE" dirty="0">
-                <a:latin typeface="Courier New" panose="02070309020205020404" pitchFamily="49" charset="0"/>
-                <a:cs typeface="Courier New" panose="02070309020205020404" pitchFamily="49" charset="0"/>
-              </a:rPr>
-              <a:t> </a:t>
-            </a:r>
-          </a:p>
-          <a:p>
-            <a:pPr marL="0" indent="0">
-              <a:buNone/>
-            </a:pPr>
-            <a:r>
-              <a:rPr lang="de-DE" dirty="0">
-                <a:latin typeface="Courier New" panose="02070309020205020404" pitchFamily="49" charset="0"/>
-                <a:cs typeface="Courier New" panose="02070309020205020404" pitchFamily="49" charset="0"/>
-              </a:rPr>
-              <a:t>	</a:t>
-            </a:r>
-            <a:r>
-              <a:rPr lang="de-DE" b="1" dirty="0" err="1">
-                <a:latin typeface="Courier New" panose="02070309020205020404" pitchFamily="49" charset="0"/>
-                <a:cs typeface="Courier New" panose="02070309020205020404" pitchFamily="49" charset="0"/>
-              </a:rPr>
-              <a:t>delete</a:t>
-            </a:r>
-            <a:r>
-              <a:rPr lang="de-DE" dirty="0">
-                <a:latin typeface="Courier New" panose="02070309020205020404" pitchFamily="49" charset="0"/>
-                <a:cs typeface="Courier New" panose="02070309020205020404" pitchFamily="49" charset="0"/>
-              </a:rPr>
-              <a:t>(</a:t>
-            </a:r>
-            <a:r>
-              <a:rPr lang="de-DE" dirty="0" err="1">
-                <a:solidFill>
-                  <a:schemeClr val="accent1">
-                    <a:lumMod val="50000"/>
-                  </a:schemeClr>
-                </a:solidFill>
-                <a:latin typeface="Courier New" panose="02070309020205020404" pitchFamily="49" charset="0"/>
-                <a:cs typeface="Courier New" panose="02070309020205020404" pitchFamily="49" charset="0"/>
-              </a:rPr>
-              <a:t>Proteome_dict</a:t>
-            </a:r>
-            <a:r>
-              <a:rPr lang="de-DE" dirty="0">
-                <a:latin typeface="Courier New" panose="02070309020205020404" pitchFamily="49" charset="0"/>
-                <a:cs typeface="Courier New" panose="02070309020205020404" pitchFamily="49" charset="0"/>
-              </a:rPr>
-              <a:t>[p])</a:t>
-            </a:r>
-          </a:p>
-          <a:p>
-            <a:pPr marL="0" indent="0">
-              <a:buNone/>
-            </a:pPr>
-            <a:r>
-              <a:rPr lang="de-DE" dirty="0">
-                <a:latin typeface="Courier New" panose="02070309020205020404" pitchFamily="49" charset="0"/>
-                <a:cs typeface="Courier New" panose="02070309020205020404" pitchFamily="49" charset="0"/>
-              </a:rPr>
-              <a:t>Reverse(</a:t>
-            </a:r>
-            <a:r>
-              <a:rPr lang="de-DE" dirty="0" err="1">
-                <a:solidFill>
-                  <a:schemeClr val="accent1">
-                    <a:lumMod val="50000"/>
-                  </a:schemeClr>
-                </a:solidFill>
-                <a:latin typeface="Courier New" panose="02070309020205020404" pitchFamily="49" charset="0"/>
-                <a:cs typeface="Courier New" panose="02070309020205020404" pitchFamily="49" charset="0"/>
-              </a:rPr>
-              <a:t>Required_proteoms</a:t>
-            </a:r>
-            <a:r>
-              <a:rPr lang="de-DE" dirty="0">
-                <a:latin typeface="Courier New" panose="02070309020205020404" pitchFamily="49" charset="0"/>
-                <a:cs typeface="Courier New" panose="02070309020205020404" pitchFamily="49" charset="0"/>
-              </a:rPr>
-              <a:t>)	</a:t>
-            </a:r>
-          </a:p>
-          <a:p>
-            <a:pPr marL="0" indent="0">
-              <a:buNone/>
-            </a:pPr>
+              <a:t>proteoms</a:t>
+            </a:r>
             <a:endParaRPr lang="de-DE" dirty="0">
               <a:latin typeface="Courier New" panose="02070309020205020404" pitchFamily="49" charset="0"/>
               <a:cs typeface="Courier New" panose="02070309020205020404" pitchFamily="49" charset="0"/>
             </a:endParaRPr>
           </a:p>
-        </p:txBody>
-      </p:sp>
+          <a:p>
+            <a:endParaRPr lang="de-DE" dirty="0">
+              <a:latin typeface="Courier New" panose="02070309020205020404" pitchFamily="49" charset="0"/>
+              <a:cs typeface="Courier New" panose="02070309020205020404" pitchFamily="49" charset="0"/>
+            </a:endParaRPr>
+          </a:p>
+        </p:txBody>
+      </p:sp>
+      <p:graphicFrame>
+        <p:nvGraphicFramePr>
+          <p:cNvPr id="4" name="Objekt 3">
+            <a:extLst>
+              <a:ext uri="{FF2B5EF4-FFF2-40B4-BE49-F238E27FC236}">
+                <a16:creationId xmlns:a16="http://schemas.microsoft.com/office/drawing/2014/main" id="{5E1D043E-D4C8-44C8-B96F-E53654ADBB5A}"/>
+              </a:ext>
+            </a:extLst>
+          </p:cNvPr>
+          <p:cNvGraphicFramePr>
+            <a:graphicFrameLocks noChangeAspect="1"/>
+          </p:cNvGraphicFramePr>
+          <p:nvPr>
+            <p:extLst>
+              <p:ext uri="{D42A27DB-BD31-4B8C-83A1-F6EECF244321}">
+                <p14:modId xmlns:p14="http://schemas.microsoft.com/office/powerpoint/2010/main" val="1869473048"/>
+              </p:ext>
+            </p:extLst>
+          </p:nvPr>
+        </p:nvGraphicFramePr>
+        <p:xfrm>
+          <a:off x="3729038" y="798513"/>
+          <a:ext cx="8237537" cy="5842000"/>
+        </p:xfrm>
+        <a:graphic>
+          <a:graphicData uri="http://schemas.openxmlformats.org/presentationml/2006/ole">
+            <mc:AlternateContent xmlns:mc="http://schemas.openxmlformats.org/markup-compatibility/2006">
+              <mc:Choice xmlns:v="urn:schemas-microsoft-com:vml" Requires="v">
+                <p:oleObj spid="_x0000_s4101" name="Document" r:id="rId3" imgW="12378626" imgH="8378755" progId="Word.Document.12">
+                  <p:embed/>
+                </p:oleObj>
+              </mc:Choice>
+              <mc:Fallback>
+                <p:oleObj name="Document" r:id="rId3" imgW="12378626" imgH="8378755" progId="Word.Document.12">
+                  <p:embed/>
+                  <p:pic>
+                    <p:nvPicPr>
+                      <p:cNvPr id="0" name=""/>
+                      <p:cNvPicPr/>
+                      <p:nvPr/>
+                    </p:nvPicPr>
+                    <p:blipFill>
+                      <a:blip r:embed="rId4"/>
+                      <a:stretch>
+                        <a:fillRect/>
+                      </a:stretch>
+                    </p:blipFill>
+                    <p:spPr>
+                      <a:xfrm>
+                        <a:off x="3729038" y="798513"/>
+                        <a:ext cx="8237537" cy="5842000"/>
+                      </a:xfrm>
+                      <a:prstGeom prst="rect">
+                        <a:avLst/>
+                      </a:prstGeom>
+                      <a:solidFill>
+                        <a:schemeClr val="bg1"/>
+                      </a:solidFill>
+                    </p:spPr>
+                  </p:pic>
+                </p:oleObj>
+              </mc:Fallback>
+            </mc:AlternateContent>
+          </a:graphicData>
+        </a:graphic>
+      </p:graphicFrame>
     </p:spTree>
     <p:extLst>
       <p:ext uri="{BB962C8B-B14F-4D97-AF65-F5344CB8AC3E}">
@@ -5097,40 +5583,290 @@
           <a:p>
             <a:r>
               <a:rPr lang="en-US" dirty="0"/>
-              <a:t>Results</a:t>
-            </a:r>
-          </a:p>
-        </p:txBody>
-      </p:sp>
-      <p:sp>
-        <p:nvSpPr>
-          <p:cNvPr id="3" name="Inhaltsplatzhalter 2">
-            <a:extLst>
-              <a:ext uri="{FF2B5EF4-FFF2-40B4-BE49-F238E27FC236}">
-                <a16:creationId xmlns:a16="http://schemas.microsoft.com/office/drawing/2014/main" id="{3794804F-FC46-40D0-91AA-B669C4B567A7}"/>
-              </a:ext>
-            </a:extLst>
-          </p:cNvPr>
-          <p:cNvSpPr>
-            <a:spLocks noGrp="1"/>
-          </p:cNvSpPr>
+              <a:t>Substitute </a:t>
+            </a:r>
+            <a:r>
+              <a:rPr lang="en-US" dirty="0" err="1"/>
+              <a:t>UniParc</a:t>
+            </a:r>
+            <a:r>
+              <a:rPr lang="en-US" dirty="0"/>
+              <a:t> to </a:t>
+            </a:r>
+            <a:r>
+              <a:rPr lang="en-US" dirty="0" err="1"/>
+              <a:t>UniProt</a:t>
+            </a:r>
+            <a:endParaRPr lang="en-US" dirty="0"/>
+          </a:p>
+        </p:txBody>
+      </p:sp>
+      <p:graphicFrame>
+        <p:nvGraphicFramePr>
+          <p:cNvPr id="4" name="Inhaltsplatzhalter 3">
+            <a:extLst>
+              <a:ext uri="{FF2B5EF4-FFF2-40B4-BE49-F238E27FC236}">
+                <a16:creationId xmlns:a16="http://schemas.microsoft.com/office/drawing/2014/main" id="{289CC1DB-1239-469A-BEC6-379FCCCC87EA}"/>
+              </a:ext>
+            </a:extLst>
+          </p:cNvPr>
+          <p:cNvGraphicFramePr>
+            <a:graphicFrameLocks noGrp="1" noChangeAspect="1"/>
+          </p:cNvGraphicFramePr>
           <p:nvPr>
             <p:ph idx="1"/>
-          </p:nvPr>
-        </p:nvSpPr>
-        <p:spPr/>
-        <p:txBody>
-          <a:bodyPr/>
-          <a:lstStyle/>
-          <a:p>
-            <a:endParaRPr lang="en-US" dirty="0"/>
-          </a:p>
-        </p:txBody>
-      </p:sp>
+            <p:extLst>
+              <p:ext uri="{D42A27DB-BD31-4B8C-83A1-F6EECF244321}">
+                <p14:modId xmlns:p14="http://schemas.microsoft.com/office/powerpoint/2010/main" val="1909662194"/>
+              </p:ext>
+            </p:extLst>
+          </p:nvPr>
+        </p:nvGraphicFramePr>
+        <p:xfrm>
+          <a:off x="2722563" y="1952625"/>
+          <a:ext cx="6664325" cy="3568700"/>
+        </p:xfrm>
+        <a:graphic>
+          <a:graphicData uri="http://schemas.openxmlformats.org/presentationml/2006/ole">
+            <mc:AlternateContent xmlns:mc="http://schemas.openxmlformats.org/markup-compatibility/2006">
+              <mc:Choice xmlns:v="urn:schemas-microsoft-com:vml" Requires="v">
+                <p:oleObj spid="_x0000_s5125" name="Document" r:id="rId3" imgW="10382631" imgH="5559159" progId="Word.Document.12">
+                  <p:embed/>
+                </p:oleObj>
+              </mc:Choice>
+              <mc:Fallback>
+                <p:oleObj name="Document" r:id="rId3" imgW="10382631" imgH="5559159" progId="Word.Document.12">
+                  <p:embed/>
+                  <p:pic>
+                    <p:nvPicPr>
+                      <p:cNvPr id="0" name=""/>
+                      <p:cNvPicPr/>
+                      <p:nvPr/>
+                    </p:nvPicPr>
+                    <p:blipFill>
+                      <a:blip r:embed="rId4"/>
+                      <a:stretch>
+                        <a:fillRect/>
+                      </a:stretch>
+                    </p:blipFill>
+                    <p:spPr>
+                      <a:xfrm>
+                        <a:off x="2722563" y="1952625"/>
+                        <a:ext cx="6664325" cy="3568700"/>
+                      </a:xfrm>
+                      <a:prstGeom prst="rect">
+                        <a:avLst/>
+                      </a:prstGeom>
+                      <a:solidFill>
+                        <a:schemeClr val="bg1"/>
+                      </a:solidFill>
+                    </p:spPr>
+                  </p:pic>
+                </p:oleObj>
+              </mc:Fallback>
+            </mc:AlternateContent>
+          </a:graphicData>
+        </a:graphic>
+      </p:graphicFrame>
     </p:spTree>
     <p:extLst>
       <p:ext uri="{BB962C8B-B14F-4D97-AF65-F5344CB8AC3E}">
-        <p14:creationId xmlns:p14="http://schemas.microsoft.com/office/powerpoint/2010/main" val="921911013"/>
+        <p14:creationId xmlns:p14="http://schemas.microsoft.com/office/powerpoint/2010/main" val="428242338"/>
+      </p:ext>
+    </p:extLst>
+  </p:cSld>
+  <p:clrMapOvr>
+    <a:masterClrMapping/>
+  </p:clrMapOvr>
+</p:sld>
+</file>
+
+<file path=ppt/slides/slide6.xml><?xml version="1.0" encoding="utf-8"?>
+<p:sld xmlns:a="http://schemas.openxmlformats.org/drawingml/2006/main" xmlns:r="http://schemas.openxmlformats.org/officeDocument/2006/relationships" xmlns:p="http://schemas.openxmlformats.org/presentationml/2006/main">
+  <p:cSld>
+    <p:bg>
+      <p:bgPr>
+        <a:gradFill>
+          <a:gsLst>
+            <a:gs pos="77000">
+              <a:schemeClr val="accent1">
+                <a:lumMod val="5000"/>
+                <a:lumOff val="95000"/>
+              </a:schemeClr>
+            </a:gs>
+            <a:gs pos="94000">
+              <a:schemeClr val="accent1">
+                <a:lumMod val="45000"/>
+                <a:lumOff val="55000"/>
+              </a:schemeClr>
+            </a:gs>
+            <a:gs pos="95000">
+              <a:schemeClr val="accent1">
+                <a:lumMod val="45000"/>
+                <a:lumOff val="55000"/>
+              </a:schemeClr>
+            </a:gs>
+            <a:gs pos="100000">
+              <a:schemeClr val="accent1">
+                <a:lumMod val="30000"/>
+                <a:lumOff val="70000"/>
+              </a:schemeClr>
+            </a:gs>
+          </a:gsLst>
+          <a:lin ang="5400000" scaled="1"/>
+        </a:gradFill>
+        <a:effectLst/>
+      </p:bgPr>
+    </p:bg>
+    <p:spTree>
+      <p:nvGrpSpPr>
+        <p:cNvPr id="1" name=""/>
+        <p:cNvGrpSpPr/>
+        <p:nvPr/>
+      </p:nvGrpSpPr>
+      <p:grpSpPr>
+        <a:xfrm>
+          <a:off x="0" y="0"/>
+          <a:ext cx="0" cy="0"/>
+          <a:chOff x="0" y="0"/>
+          <a:chExt cx="0" cy="0"/>
+        </a:xfrm>
+      </p:grpSpPr>
+      <p:sp>
+        <p:nvSpPr>
+          <p:cNvPr id="2" name="Titel 1">
+            <a:extLst>
+              <a:ext uri="{FF2B5EF4-FFF2-40B4-BE49-F238E27FC236}">
+                <a16:creationId xmlns:a16="http://schemas.microsoft.com/office/drawing/2014/main" id="{5E512D55-7C05-4B08-B53F-2D8B210884FB}"/>
+              </a:ext>
+            </a:extLst>
+          </p:cNvPr>
+          <p:cNvSpPr>
+            <a:spLocks noGrp="1"/>
+          </p:cNvSpPr>
+          <p:nvPr>
+            <p:ph type="title"/>
+          </p:nvPr>
+        </p:nvSpPr>
+        <p:spPr/>
+        <p:txBody>
+          <a:bodyPr/>
+          <a:lstStyle/>
+          <a:p>
+            <a:r>
+              <a:rPr lang="en-US" dirty="0"/>
+              <a:t>Results</a:t>
+            </a:r>
+          </a:p>
+        </p:txBody>
+      </p:sp>
+      <p:sp>
+        <p:nvSpPr>
+          <p:cNvPr id="3" name="Inhaltsplatzhalter 2">
+            <a:extLst>
+              <a:ext uri="{FF2B5EF4-FFF2-40B4-BE49-F238E27FC236}">
+                <a16:creationId xmlns:a16="http://schemas.microsoft.com/office/drawing/2014/main" id="{3794804F-FC46-40D0-91AA-B669C4B567A7}"/>
+              </a:ext>
+            </a:extLst>
+          </p:cNvPr>
+          <p:cNvSpPr>
+            <a:spLocks noGrp="1"/>
+          </p:cNvSpPr>
+          <p:nvPr>
+            <p:ph idx="1"/>
+          </p:nvPr>
+        </p:nvSpPr>
+        <p:spPr/>
+        <p:txBody>
+          <a:bodyPr/>
+          <a:lstStyle/>
+          <a:p>
+            <a:r>
+              <a:rPr lang="en-US" dirty="0"/>
+              <a:t>1946 proteomes given</a:t>
+            </a:r>
+          </a:p>
+          <a:p>
+            <a:r>
+              <a:rPr lang="en-US" dirty="0"/>
+              <a:t> reduced to 254</a:t>
+            </a:r>
+          </a:p>
+          <a:p>
+            <a:r>
+              <a:rPr lang="en-US" dirty="0"/>
+              <a:t>13.05% of input</a:t>
+            </a:r>
+          </a:p>
+          <a:p>
+            <a:pPr marL="0" indent="0">
+              <a:buNone/>
+            </a:pPr>
+            <a:r>
+              <a:rPr lang="en-US" dirty="0"/>
+              <a:t>Is it optimal? </a:t>
+            </a:r>
+          </a:p>
+          <a:p>
+            <a:pPr marL="0" indent="0">
+              <a:buNone/>
+            </a:pPr>
+            <a:r>
+              <a:rPr lang="en-US" dirty="0"/>
+              <a:t>We don’t know! </a:t>
+            </a:r>
+          </a:p>
+          <a:p>
+            <a:pPr marL="0" indent="0">
+              <a:buNone/>
+            </a:pPr>
+            <a:r>
+              <a:rPr lang="en-US" dirty="0"/>
+              <a:t>It’s hard to find out.</a:t>
+            </a:r>
+          </a:p>
+        </p:txBody>
+      </p:sp>
+      <p:pic>
+        <p:nvPicPr>
+          <p:cNvPr id="5" name="Grafik 4">
+            <a:extLst>
+              <a:ext uri="{FF2B5EF4-FFF2-40B4-BE49-F238E27FC236}">
+                <a16:creationId xmlns:a16="http://schemas.microsoft.com/office/drawing/2014/main" id="{3A3060DC-1465-4281-9244-B8A36619C7E0}"/>
+              </a:ext>
+            </a:extLst>
+          </p:cNvPr>
+          <p:cNvPicPr>
+            <a:picLocks noChangeAspect="1"/>
+          </p:cNvPicPr>
+          <p:nvPr/>
+        </p:nvPicPr>
+        <p:blipFill>
+          <a:blip r:embed="rId2">
+            <a:extLst>
+              <a:ext uri="{28A0092B-C50C-407E-A947-70E740481C1C}">
+                <a14:useLocalDpi xmlns:a14="http://schemas.microsoft.com/office/drawing/2010/main" val="0"/>
+              </a:ext>
+            </a:extLst>
+          </a:blip>
+          <a:stretch>
+            <a:fillRect/>
+          </a:stretch>
+        </p:blipFill>
+        <p:spPr>
+          <a:xfrm>
+            <a:off x="4773478" y="109377"/>
+            <a:ext cx="7542508" cy="6067586"/>
+          </a:xfrm>
+          <a:prstGeom prst="rect">
+            <a:avLst/>
+          </a:prstGeom>
+        </p:spPr>
+      </p:pic>
+    </p:spTree>
+    <p:extLst>
+      <p:ext uri="{BB962C8B-B14F-4D97-AF65-F5344CB8AC3E}">
+        <p14:creationId xmlns:p14="http://schemas.microsoft.com/office/powerpoint/2010/main" val="1097101335"/>
       </p:ext>
     </p:extLst>
   </p:cSld>

</xml_diff>